<commit_message>
Michtava Presentation - Version 2
</commit_message>
<xml_diff>
--- a/Michtava - Presentation.pptx
+++ b/Michtava - Presentation.pptx
@@ -5,9 +5,9 @@
     <p:sldMasterId id="2147483648" r:id="rId1"/>
   </p:sldMasterIdLst>
   <p:sldIdLst>
-    <p:sldId id="256" r:id="rId2"/>
-    <p:sldId id="267" r:id="rId3"/>
-    <p:sldId id="257" r:id="rId4"/>
+    <p:sldId id="267" r:id="rId2"/>
+    <p:sldId id="257" r:id="rId3"/>
+    <p:sldId id="268" r:id="rId4"/>
     <p:sldId id="260" r:id="rId5"/>
     <p:sldId id="258" r:id="rId6"/>
     <p:sldId id="265" r:id="rId7"/>
@@ -251,7 +251,7 @@
           <a:p>
             <a:fld id="{2415F1F3-3BD1-4C3C-972D-1C61D1AC7CDD}" type="datetimeFigureOut">
               <a:rPr lang="en-US" smtClean="0"/>
-              <a:t>06/17/2017</a:t>
+              <a:t>06/18/2017</a:t>
             </a:fld>
             <a:endParaRPr lang="en-US"/>
           </a:p>
@@ -419,7 +419,7 @@
           <a:p>
             <a:fld id="{2415F1F3-3BD1-4C3C-972D-1C61D1AC7CDD}" type="datetimeFigureOut">
               <a:rPr lang="en-US" smtClean="0"/>
-              <a:t>06/17/2017</a:t>
+              <a:t>06/18/2017</a:t>
             </a:fld>
             <a:endParaRPr lang="en-US"/>
           </a:p>
@@ -597,7 +597,7 @@
           <a:p>
             <a:fld id="{2415F1F3-3BD1-4C3C-972D-1C61D1AC7CDD}" type="datetimeFigureOut">
               <a:rPr lang="en-US" smtClean="0"/>
-              <a:t>06/17/2017</a:t>
+              <a:t>06/18/2017</a:t>
             </a:fld>
             <a:endParaRPr lang="en-US"/>
           </a:p>
@@ -765,7 +765,7 @@
           <a:p>
             <a:fld id="{2415F1F3-3BD1-4C3C-972D-1C61D1AC7CDD}" type="datetimeFigureOut">
               <a:rPr lang="en-US" smtClean="0"/>
-              <a:t>06/17/2017</a:t>
+              <a:t>06/18/2017</a:t>
             </a:fld>
             <a:endParaRPr lang="en-US"/>
           </a:p>
@@ -1010,7 +1010,7 @@
           <a:p>
             <a:fld id="{2415F1F3-3BD1-4C3C-972D-1C61D1AC7CDD}" type="datetimeFigureOut">
               <a:rPr lang="en-US" smtClean="0"/>
-              <a:t>06/17/2017</a:t>
+              <a:t>06/18/2017</a:t>
             </a:fld>
             <a:endParaRPr lang="en-US"/>
           </a:p>
@@ -1239,7 +1239,7 @@
           <a:p>
             <a:fld id="{2415F1F3-3BD1-4C3C-972D-1C61D1AC7CDD}" type="datetimeFigureOut">
               <a:rPr lang="en-US" smtClean="0"/>
-              <a:t>06/17/2017</a:t>
+              <a:t>06/18/2017</a:t>
             </a:fld>
             <a:endParaRPr lang="en-US"/>
           </a:p>
@@ -1603,7 +1603,7 @@
           <a:p>
             <a:fld id="{2415F1F3-3BD1-4C3C-972D-1C61D1AC7CDD}" type="datetimeFigureOut">
               <a:rPr lang="en-US" smtClean="0"/>
-              <a:t>06/17/2017</a:t>
+              <a:t>06/18/2017</a:t>
             </a:fld>
             <a:endParaRPr lang="en-US"/>
           </a:p>
@@ -1720,7 +1720,7 @@
           <a:p>
             <a:fld id="{2415F1F3-3BD1-4C3C-972D-1C61D1AC7CDD}" type="datetimeFigureOut">
               <a:rPr lang="en-US" smtClean="0"/>
-              <a:t>06/17/2017</a:t>
+              <a:t>06/18/2017</a:t>
             </a:fld>
             <a:endParaRPr lang="en-US"/>
           </a:p>
@@ -1815,7 +1815,7 @@
           <a:p>
             <a:fld id="{2415F1F3-3BD1-4C3C-972D-1C61D1AC7CDD}" type="datetimeFigureOut">
               <a:rPr lang="en-US" smtClean="0"/>
-              <a:t>06/17/2017</a:t>
+              <a:t>06/18/2017</a:t>
             </a:fld>
             <a:endParaRPr lang="en-US"/>
           </a:p>
@@ -2090,7 +2090,7 @@
           <a:p>
             <a:fld id="{2415F1F3-3BD1-4C3C-972D-1C61D1AC7CDD}" type="datetimeFigureOut">
               <a:rPr lang="en-US" smtClean="0"/>
-              <a:t>06/17/2017</a:t>
+              <a:t>06/18/2017</a:t>
             </a:fld>
             <a:endParaRPr lang="en-US"/>
           </a:p>
@@ -2342,7 +2342,7 @@
           <a:p>
             <a:fld id="{2415F1F3-3BD1-4C3C-972D-1C61D1AC7CDD}" type="datetimeFigureOut">
               <a:rPr lang="en-US" smtClean="0"/>
-              <a:t>06/17/2017</a:t>
+              <a:t>06/18/2017</a:t>
             </a:fld>
             <a:endParaRPr lang="en-US"/>
           </a:p>
@@ -2562,7 +2562,7 @@
           <a:p>
             <a:fld id="{2415F1F3-3BD1-4C3C-972D-1C61D1AC7CDD}" type="datetimeFigureOut">
               <a:rPr lang="en-US" smtClean="0"/>
-              <a:t>06/17/2017</a:t>
+              <a:t>06/18/2017</a:t>
             </a:fld>
             <a:endParaRPr lang="en-US"/>
           </a:p>
@@ -2967,56 +2967,6 @@
           <a:chExt cx="0" cy="0"/>
         </a:xfrm>
       </p:grpSpPr>
-      <p:sp>
-        <p:nvSpPr>
-          <p:cNvPr id="4" name="TextBox 3"/>
-          <p:cNvSpPr txBox="1"/>
-          <p:nvPr/>
-        </p:nvSpPr>
-        <p:spPr>
-          <a:xfrm>
-            <a:off x="2361460" y="1537467"/>
-            <a:ext cx="8194090" cy="1477328"/>
-          </a:xfrm>
-          <a:prstGeom prst="rect">
-            <a:avLst/>
-          </a:prstGeom>
-          <a:noFill/>
-        </p:spPr>
-        <p:txBody>
-          <a:bodyPr wrap="square" rtlCol="0">
-            <a:spAutoFit/>
-          </a:bodyPr>
-          <a:lstStyle/>
-          <a:p>
-            <a:pPr algn="ctr"/>
-            <a:r>
-              <a:rPr lang="he-IL" b="1" u="sng" dirty="0"/>
-              <a:t>נושאים נוספים להצגה:</a:t>
-            </a:r>
-            <a:endParaRPr lang="en-US" b="1" u="sng" dirty="0"/>
-          </a:p>
-          <a:p>
-            <a:pPr algn="ctr"/>
-            <a:endParaRPr lang="en-US" b="1" u="sng" dirty="0"/>
-          </a:p>
-          <a:p>
-            <a:pPr algn="r"/>
-            <a:r>
-              <a:rPr lang="he-IL" dirty="0"/>
-              <a:t>- ניהול משתמשים וכניסה נפרדת לאדמינים לניהול המשתמשים האחרים והכיתות</a:t>
-            </a:r>
-          </a:p>
-          <a:p>
-            <a:pPr algn="r"/>
-            <a:r>
-              <a:rPr lang="he-IL" dirty="0"/>
-              <a:t>- הפונקציונליות של תיבת הטקסט החכמה וההפרדה שלה רכיב עצמאי לשימוש גם בפרויקטים אחרים</a:t>
-            </a:r>
-            <a:endParaRPr lang="en-US" dirty="0"/>
-          </a:p>
-        </p:txBody>
-      </p:sp>
       <p:pic>
         <p:nvPicPr>
           <p:cNvPr id="2" name="Picture 1"/>
@@ -3039,18 +2989,153 @@
         </p:blipFill>
         <p:spPr>
           <a:xfrm>
-            <a:off x="9862456" y="0"/>
-            <a:ext cx="2329543" cy="1341817"/>
+            <a:off x="4201495" y="81357"/>
+            <a:ext cx="5619784" cy="3236996"/>
           </a:xfrm>
           <a:prstGeom prst="rect">
             <a:avLst/>
           </a:prstGeom>
         </p:spPr>
       </p:pic>
+      <p:sp>
+        <p:nvSpPr>
+          <p:cNvPr id="5" name="TextBox 4"/>
+          <p:cNvSpPr txBox="1"/>
+          <p:nvPr/>
+        </p:nvSpPr>
+        <p:spPr>
+          <a:xfrm>
+            <a:off x="7770538" y="3318353"/>
+            <a:ext cx="2361461" cy="1200329"/>
+          </a:xfrm>
+          <a:prstGeom prst="rect">
+            <a:avLst/>
+          </a:prstGeom>
+          <a:noFill/>
+        </p:spPr>
+        <p:txBody>
+          <a:bodyPr wrap="square" rtlCol="0">
+            <a:spAutoFit/>
+          </a:bodyPr>
+          <a:lstStyle/>
+          <a:p>
+            <a:pPr algn="ctr"/>
+            <a:r>
+              <a:rPr lang="he-IL" b="1" u="sng" dirty="0"/>
+              <a:t>סטודנטים:</a:t>
+            </a:r>
+          </a:p>
+          <a:p>
+            <a:pPr algn="ctr"/>
+            <a:r>
+              <a:rPr lang="he-IL" dirty="0"/>
+              <a:t>שי דיין</a:t>
+            </a:r>
+          </a:p>
+          <a:p>
+            <a:pPr algn="ctr"/>
+            <a:r>
+              <a:rPr lang="he-IL" dirty="0"/>
+              <a:t>רועי פילר</a:t>
+            </a:r>
+          </a:p>
+          <a:p>
+            <a:pPr algn="ctr"/>
+            <a:r>
+              <a:rPr lang="he-IL" dirty="0"/>
+              <a:t>מגל וייס</a:t>
+            </a:r>
+            <a:endParaRPr lang="en-US" dirty="0"/>
+          </a:p>
+        </p:txBody>
+      </p:sp>
+      <p:sp>
+        <p:nvSpPr>
+          <p:cNvPr id="6" name="TextBox 5"/>
+          <p:cNvSpPr txBox="1"/>
+          <p:nvPr/>
+        </p:nvSpPr>
+        <p:spPr>
+          <a:xfrm>
+            <a:off x="5280242" y="3318353"/>
+            <a:ext cx="2361461" cy="923330"/>
+          </a:xfrm>
+          <a:prstGeom prst="rect">
+            <a:avLst/>
+          </a:prstGeom>
+          <a:noFill/>
+        </p:spPr>
+        <p:txBody>
+          <a:bodyPr wrap="square" rtlCol="0">
+            <a:spAutoFit/>
+          </a:bodyPr>
+          <a:lstStyle/>
+          <a:p>
+            <a:pPr algn="ctr"/>
+            <a:r>
+              <a:rPr lang="he-IL" b="1" u="sng" dirty="0"/>
+              <a:t>מנחים אקדמים:</a:t>
+            </a:r>
+          </a:p>
+          <a:p>
+            <a:pPr algn="ctr"/>
+            <a:r>
+              <a:rPr lang="he-IL" dirty="0"/>
+              <a:t>ד"ר ארנון שטורם</a:t>
+            </a:r>
+          </a:p>
+          <a:p>
+            <a:pPr algn="ctr"/>
+            <a:r>
+              <a:rPr lang="he-IL" dirty="0"/>
+              <a:t>ד"ר יוסי אורן</a:t>
+            </a:r>
+            <a:endParaRPr lang="en-US" dirty="0"/>
+          </a:p>
+        </p:txBody>
+      </p:sp>
+      <p:sp>
+        <p:nvSpPr>
+          <p:cNvPr id="7" name="TextBox 6"/>
+          <p:cNvSpPr txBox="1"/>
+          <p:nvPr/>
+        </p:nvSpPr>
+        <p:spPr>
+          <a:xfrm>
+            <a:off x="2457143" y="3318353"/>
+            <a:ext cx="2361461" cy="646331"/>
+          </a:xfrm>
+          <a:prstGeom prst="rect">
+            <a:avLst/>
+          </a:prstGeom>
+          <a:noFill/>
+        </p:spPr>
+        <p:txBody>
+          <a:bodyPr wrap="square" rtlCol="0">
+            <a:spAutoFit/>
+          </a:bodyPr>
+          <a:lstStyle/>
+          <a:p>
+            <a:pPr algn="ctr"/>
+            <a:r>
+              <a:rPr lang="he-IL" b="1" u="sng" dirty="0"/>
+              <a:t>מנחה מקצועית:</a:t>
+            </a:r>
+          </a:p>
+          <a:p>
+            <a:pPr algn="ctr"/>
+            <a:r>
+              <a:rPr lang="he-IL" dirty="0"/>
+              <a:t>טליה מרמור בן רעי</a:t>
+            </a:r>
+            <a:endParaRPr lang="en-US" dirty="0"/>
+          </a:p>
+        </p:txBody>
+      </p:sp>
     </p:spTree>
     <p:extLst>
       <p:ext uri="{BB962C8B-B14F-4D97-AF65-F5344CB8AC3E}">
-        <p14:creationId xmlns:p14="http://schemas.microsoft.com/office/powerpoint/2010/main" val="2341519515"/>
+        <p14:creationId xmlns:p14="http://schemas.microsoft.com/office/powerpoint/2010/main" val="3167561741"/>
       </p:ext>
     </p:extLst>
   </p:cSld>
@@ -3162,6 +3247,59 @@
               </a:solidFill>
               <a:effectLst/>
             </a:endParaRPr>
+          </a:p>
+        </p:txBody>
+      </p:sp>
+      <p:sp>
+        <p:nvSpPr>
+          <p:cNvPr id="5" name="TextBox 4"/>
+          <p:cNvSpPr txBox="1"/>
+          <p:nvPr/>
+        </p:nvSpPr>
+        <p:spPr>
+          <a:xfrm>
+            <a:off x="1324252" y="1876298"/>
+            <a:ext cx="8194090" cy="923330"/>
+          </a:xfrm>
+          <a:prstGeom prst="rect">
+            <a:avLst/>
+          </a:prstGeom>
+          <a:noFill/>
+        </p:spPr>
+        <p:txBody>
+          <a:bodyPr wrap="square" rtlCol="0">
+            <a:spAutoFit/>
+          </a:bodyPr>
+          <a:lstStyle/>
+          <a:p>
+            <a:pPr marL="285750" indent="-285750">
+              <a:buFont typeface="Arial" panose="020B0604020202020204" pitchFamily="34" charset="0"/>
+              <a:buChar char="•"/>
+            </a:pPr>
+            <a:r>
+              <a:rPr lang="en-US" dirty="0"/>
+              <a:t>1</a:t>
+            </a:r>
+          </a:p>
+          <a:p>
+            <a:pPr marL="285750" indent="-285750">
+              <a:buFont typeface="Arial" panose="020B0604020202020204" pitchFamily="34" charset="0"/>
+              <a:buChar char="•"/>
+            </a:pPr>
+            <a:r>
+              <a:rPr lang="en-US" dirty="0"/>
+              <a:t>2</a:t>
+            </a:r>
+          </a:p>
+          <a:p>
+            <a:pPr marL="285750" indent="-285750">
+              <a:buFont typeface="Arial" panose="020B0604020202020204" pitchFamily="34" charset="0"/>
+              <a:buChar char="•"/>
+            </a:pPr>
+            <a:r>
+              <a:rPr lang="en-US" dirty="0"/>
+              <a:t>3 </a:t>
+            </a:r>
           </a:p>
         </p:txBody>
       </p:sp>
@@ -3412,8 +3550,8 @@
         </p:blipFill>
         <p:spPr>
           <a:xfrm>
-            <a:off x="3651080" y="0"/>
-            <a:ext cx="5619784" cy="3236996"/>
+            <a:off x="9862456" y="0"/>
+            <a:ext cx="2329543" cy="1341817"/>
           </a:xfrm>
           <a:prstGeom prst="rect">
             <a:avLst/>
@@ -3422,14 +3560,58 @@
       </p:pic>
       <p:sp>
         <p:nvSpPr>
-          <p:cNvPr id="5" name="TextBox 4"/>
+          <p:cNvPr id="6" name="Rectangle 5"/>
+          <p:cNvSpPr/>
+          <p:nvPr/>
+        </p:nvSpPr>
+        <p:spPr>
+          <a:xfrm>
+            <a:off x="3051819" y="418487"/>
+            <a:ext cx="5701564" cy="707886"/>
+          </a:xfrm>
+          <a:prstGeom prst="rect">
+            <a:avLst/>
+          </a:prstGeom>
+          <a:noFill/>
+        </p:spPr>
+        <p:txBody>
+          <a:bodyPr wrap="square" lIns="91440" tIns="45720" rIns="91440" bIns="45720">
+            <a:spAutoFit/>
+          </a:bodyPr>
+          <a:lstStyle/>
+          <a:p>
+            <a:pPr algn="ctr"/>
+            <a:r>
+              <a:rPr lang="en-US" sz="4000" b="1" cap="none" spc="0" dirty="0">
+                <a:ln w="22225">
+                  <a:solidFill>
+                    <a:schemeClr val="accent2"/>
+                  </a:solidFill>
+                  <a:prstDash val="solid"/>
+                </a:ln>
+                <a:solidFill>
+                  <a:schemeClr val="accent2">
+                    <a:lumMod val="40000"/>
+                    <a:lumOff val="60000"/>
+                  </a:schemeClr>
+                </a:solidFill>
+                <a:effectLst/>
+              </a:rPr>
+              <a:t>Background</a:t>
+            </a:r>
+          </a:p>
+        </p:txBody>
+      </p:sp>
+      <p:sp>
+        <p:nvSpPr>
+          <p:cNvPr id="8" name="TextBox 7"/>
           <p:cNvSpPr txBox="1"/>
           <p:nvPr/>
         </p:nvSpPr>
         <p:spPr>
           <a:xfrm>
-            <a:off x="7770538" y="3318353"/>
-            <a:ext cx="2361461" cy="1200329"/>
+            <a:off x="676183" y="1625902"/>
+            <a:ext cx="8744505" cy="923330"/>
           </a:xfrm>
           <a:prstGeom prst="rect">
             <a:avLst/>
@@ -3442,123 +3624,71 @@
           </a:bodyPr>
           <a:lstStyle/>
           <a:p>
-            <a:pPr algn="ctr"/>
-            <a:r>
-              <a:rPr lang="he-IL" b="1" u="sng" dirty="0"/>
-              <a:t>סטודנטים:</a:t>
-            </a:r>
-          </a:p>
-          <a:p>
-            <a:pPr algn="ctr"/>
-            <a:r>
-              <a:rPr lang="he-IL" dirty="0"/>
-              <a:t>שי דיין</a:t>
-            </a:r>
-          </a:p>
-          <a:p>
-            <a:pPr algn="ctr"/>
-            <a:r>
-              <a:rPr lang="he-IL" dirty="0"/>
-              <a:t>רועי פילר</a:t>
-            </a:r>
-          </a:p>
-          <a:p>
-            <a:pPr algn="ctr"/>
-            <a:r>
-              <a:rPr lang="he-IL" dirty="0"/>
-              <a:t>מגל וייס</a:t>
-            </a:r>
-            <a:endParaRPr lang="en-US" dirty="0"/>
-          </a:p>
-        </p:txBody>
-      </p:sp>
-      <p:sp>
-        <p:nvSpPr>
-          <p:cNvPr id="6" name="TextBox 5"/>
-          <p:cNvSpPr txBox="1"/>
-          <p:nvPr/>
-        </p:nvSpPr>
-        <p:spPr>
-          <a:xfrm>
-            <a:off x="5280242" y="3318353"/>
-            <a:ext cx="2361461" cy="923330"/>
-          </a:xfrm>
-          <a:prstGeom prst="rect">
-            <a:avLst/>
-          </a:prstGeom>
-          <a:noFill/>
-        </p:spPr>
-        <p:txBody>
-          <a:bodyPr wrap="square" rtlCol="0">
-            <a:spAutoFit/>
-          </a:bodyPr>
-          <a:lstStyle/>
-          <a:p>
-            <a:pPr algn="ctr"/>
-            <a:r>
-              <a:rPr lang="he-IL" b="1" u="sng" dirty="0"/>
-              <a:t>מנחים אקדמים:</a:t>
-            </a:r>
-          </a:p>
-          <a:p>
-            <a:pPr algn="ctr"/>
-            <a:r>
-              <a:rPr lang="he-IL" dirty="0"/>
-              <a:t>ד"ר ארנון שטורם</a:t>
-            </a:r>
-          </a:p>
-          <a:p>
-            <a:pPr algn="ctr"/>
-            <a:r>
-              <a:rPr lang="he-IL" dirty="0"/>
-              <a:t>ד"ר יוסי אורן</a:t>
-            </a:r>
-            <a:endParaRPr lang="en-US" dirty="0"/>
-          </a:p>
-        </p:txBody>
-      </p:sp>
-      <p:sp>
-        <p:nvSpPr>
-          <p:cNvPr id="7" name="TextBox 6"/>
-          <p:cNvSpPr txBox="1"/>
-          <p:nvPr/>
-        </p:nvSpPr>
-        <p:spPr>
-          <a:xfrm>
-            <a:off x="2457143" y="3318353"/>
-            <a:ext cx="2361461" cy="646331"/>
-          </a:xfrm>
-          <a:prstGeom prst="rect">
-            <a:avLst/>
-          </a:prstGeom>
-          <a:noFill/>
-        </p:spPr>
-        <p:txBody>
-          <a:bodyPr wrap="square" rtlCol="0">
-            <a:spAutoFit/>
-          </a:bodyPr>
-          <a:lstStyle/>
-          <a:p>
-            <a:pPr algn="ctr"/>
-            <a:r>
-              <a:rPr lang="he-IL" b="1" u="sng" dirty="0"/>
-              <a:t>מנחה מקצועית:</a:t>
-            </a:r>
-          </a:p>
-          <a:p>
-            <a:pPr algn="ctr"/>
-            <a:r>
-              <a:rPr lang="he-IL" dirty="0"/>
-              <a:t>טליה מרמור בן רעי</a:t>
-            </a:r>
-            <a:endParaRPr lang="en-US" dirty="0"/>
-          </a:p>
-        </p:txBody>
-      </p:sp>
+            <a:pPr marL="285750" indent="-285750">
+              <a:buFont typeface="Arial" panose="020B0604020202020204" pitchFamily="34" charset="0"/>
+              <a:buChar char="•"/>
+            </a:pPr>
+            <a:r>
+              <a:rPr lang="en-US" dirty="0"/>
+              <a:t>There is a need for modern tools for effective and fast writing skills improvement</a:t>
+            </a:r>
+          </a:p>
+          <a:p>
+            <a:pPr marL="285750" indent="-285750">
+              <a:buFont typeface="Arial" panose="020B0604020202020204" pitchFamily="34" charset="0"/>
+              <a:buChar char="•"/>
+            </a:pPr>
+            <a:r>
+              <a:rPr lang="en-US" dirty="0"/>
+              <a:t>There is a need for attracting students in the fast growing technology world</a:t>
+            </a:r>
+          </a:p>
+          <a:p>
+            <a:pPr marL="285750" indent="-285750">
+              <a:buFont typeface="Arial" panose="020B0604020202020204" pitchFamily="34" charset="0"/>
+              <a:buChar char="•"/>
+            </a:pPr>
+            <a:r>
+              <a:rPr lang="en-US" dirty="0"/>
+              <a:t>Excellent writing skills significantly help to get opportunities in the real world</a:t>
+            </a:r>
+          </a:p>
+        </p:txBody>
+      </p:sp>
+      <p:pic>
+        <p:nvPicPr>
+          <p:cNvPr id="3" name="Picture 2"/>
+          <p:cNvPicPr>
+            <a:picLocks noChangeAspect="1"/>
+          </p:cNvPicPr>
+          <p:nvPr/>
+        </p:nvPicPr>
+        <p:blipFill>
+          <a:blip r:embed="rId3">
+            <a:extLst>
+              <a:ext uri="{28A0092B-C50C-407E-A947-70E740481C1C}">
+                <a14:useLocalDpi xmlns:a14="http://schemas.microsoft.com/office/drawing/2010/main" val="0"/>
+              </a:ext>
+            </a:extLst>
+          </a:blip>
+          <a:stretch>
+            <a:fillRect/>
+          </a:stretch>
+        </p:blipFill>
+        <p:spPr>
+          <a:xfrm>
+            <a:off x="4874611" y="2817942"/>
+            <a:ext cx="3088661" cy="2475871"/>
+          </a:xfrm>
+          <a:prstGeom prst="rect">
+            <a:avLst/>
+          </a:prstGeom>
+        </p:spPr>
+      </p:pic>
     </p:spTree>
     <p:extLst>
       <p:ext uri="{BB962C8B-B14F-4D97-AF65-F5344CB8AC3E}">
-        <p14:creationId xmlns:p14="http://schemas.microsoft.com/office/powerpoint/2010/main" val="3167561741"/>
+        <p14:creationId xmlns:p14="http://schemas.microsoft.com/office/powerpoint/2010/main" val="3987862869"/>
       </p:ext>
     </p:extLst>
   </p:cSld>
@@ -3617,14 +3747,14 @@
       </p:pic>
       <p:sp>
         <p:nvSpPr>
-          <p:cNvPr id="5" name="TextBox 4"/>
+          <p:cNvPr id="4" name="TextBox 3"/>
           <p:cNvSpPr txBox="1"/>
           <p:nvPr/>
         </p:nvSpPr>
         <p:spPr>
           <a:xfrm>
-            <a:off x="2361460" y="1537467"/>
-            <a:ext cx="8194090" cy="369332"/>
+            <a:off x="676183" y="1625902"/>
+            <a:ext cx="8744505" cy="1200329"/>
           </a:xfrm>
           <a:prstGeom prst="rect">
             <a:avLst/>
@@ -3637,19 +3767,161 @@
           </a:bodyPr>
           <a:lstStyle/>
           <a:p>
+            <a:pPr marL="285750" indent="-285750">
+              <a:buFont typeface="Arial" panose="020B0604020202020204" pitchFamily="34" charset="0"/>
+              <a:buChar char="•"/>
+            </a:pPr>
+            <a:r>
+              <a:rPr lang="en-US" dirty="0"/>
+              <a:t>Friendly WEB learning system</a:t>
+            </a:r>
+          </a:p>
+          <a:p>
+            <a:pPr marL="285750" indent="-285750">
+              <a:buFont typeface="Arial" panose="020B0604020202020204" pitchFamily="34" charset="0"/>
+              <a:buChar char="•"/>
+            </a:pPr>
+            <a:r>
+              <a:rPr lang="en-US" dirty="0"/>
+              <a:t>Three roles – Student, Teacher and Administrator</a:t>
+            </a:r>
+          </a:p>
+          <a:p>
+            <a:pPr marL="285750" indent="-285750">
+              <a:buFont typeface="Arial" panose="020B0604020202020204" pitchFamily="34" charset="0"/>
+              <a:buChar char="•"/>
+            </a:pPr>
+            <a:r>
+              <a:rPr lang="en-US" dirty="0"/>
+              <a:t>Uploading and managing contents</a:t>
+            </a:r>
+          </a:p>
+          <a:p>
+            <a:pPr marL="285750" indent="-285750">
+              <a:buFont typeface="Arial" panose="020B0604020202020204" pitchFamily="34" charset="0"/>
+              <a:buChar char="•"/>
+            </a:pPr>
+            <a:r>
+              <a:rPr lang="en-US" dirty="0"/>
+              <a:t>Smart Textbox for supporting and improving students’ answers in real-time</a:t>
+            </a:r>
+          </a:p>
+        </p:txBody>
+      </p:sp>
+      <p:sp>
+        <p:nvSpPr>
+          <p:cNvPr id="6" name="Rectangle 5"/>
+          <p:cNvSpPr/>
+          <p:nvPr/>
+        </p:nvSpPr>
+        <p:spPr>
+          <a:xfrm>
+            <a:off x="3051819" y="418487"/>
+            <a:ext cx="5701564" cy="707886"/>
+          </a:xfrm>
+          <a:prstGeom prst="rect">
+            <a:avLst/>
+          </a:prstGeom>
+          <a:noFill/>
+        </p:spPr>
+        <p:txBody>
+          <a:bodyPr wrap="square" lIns="91440" tIns="45720" rIns="91440" bIns="45720">
+            <a:spAutoFit/>
+          </a:bodyPr>
+          <a:lstStyle/>
+          <a:p>
             <a:pPr algn="ctr"/>
             <a:r>
-              <a:rPr lang="he-IL" dirty="0"/>
-              <a:t>רקע כללי על הפרויקט</a:t>
-            </a:r>
-            <a:endParaRPr lang="en-US" dirty="0"/>
-          </a:p>
-        </p:txBody>
-      </p:sp>
+              <a:rPr lang="en-US" sz="4000" b="1" cap="none" spc="0" dirty="0" err="1">
+                <a:ln w="22225">
+                  <a:solidFill>
+                    <a:schemeClr val="accent2"/>
+                  </a:solidFill>
+                  <a:prstDash val="solid"/>
+                </a:ln>
+                <a:solidFill>
+                  <a:schemeClr val="accent2">
+                    <a:lumMod val="40000"/>
+                    <a:lumOff val="60000"/>
+                  </a:schemeClr>
+                </a:solidFill>
+                <a:effectLst/>
+              </a:rPr>
+              <a:t>Michtava</a:t>
+            </a:r>
+            <a:r>
+              <a:rPr lang="en-US" sz="4000" b="1" cap="none" spc="0" dirty="0">
+                <a:ln w="22225">
+                  <a:solidFill>
+                    <a:schemeClr val="accent2"/>
+                  </a:solidFill>
+                  <a:prstDash val="solid"/>
+                </a:ln>
+                <a:solidFill>
+                  <a:schemeClr val="accent2">
+                    <a:lumMod val="40000"/>
+                    <a:lumOff val="60000"/>
+                  </a:schemeClr>
+                </a:solidFill>
+                <a:effectLst/>
+              </a:rPr>
+              <a:t> Solution</a:t>
+            </a:r>
+          </a:p>
+        </p:txBody>
+      </p:sp>
+      <p:pic>
+        <p:nvPicPr>
+          <p:cNvPr id="3" name="Picture 2"/>
+          <p:cNvPicPr>
+            <a:picLocks noChangeAspect="1"/>
+          </p:cNvPicPr>
+          <p:nvPr/>
+        </p:nvPicPr>
+        <p:blipFill>
+          <a:blip r:embed="rId3"/>
+          <a:stretch>
+            <a:fillRect/>
+          </a:stretch>
+        </p:blipFill>
+        <p:spPr>
+          <a:xfrm>
+            <a:off x="1047565" y="3325760"/>
+            <a:ext cx="4483223" cy="3258483"/>
+          </a:xfrm>
+          <a:prstGeom prst="rect">
+            <a:avLst/>
+          </a:prstGeom>
+        </p:spPr>
+      </p:pic>
+      <p:pic>
+        <p:nvPicPr>
+          <p:cNvPr id="5" name="Picture 4"/>
+          <p:cNvPicPr>
+            <a:picLocks noChangeAspect="1"/>
+          </p:cNvPicPr>
+          <p:nvPr/>
+        </p:nvPicPr>
+        <p:blipFill>
+          <a:blip r:embed="rId4"/>
+          <a:stretch>
+            <a:fillRect/>
+          </a:stretch>
+        </p:blipFill>
+        <p:spPr>
+          <a:xfrm>
+            <a:off x="6117546" y="3325760"/>
+            <a:ext cx="4661014" cy="3258483"/>
+          </a:xfrm>
+          <a:prstGeom prst="rect">
+            <a:avLst/>
+          </a:prstGeom>
+        </p:spPr>
+      </p:pic>
     </p:spTree>
     <p:extLst>
       <p:ext uri="{BB962C8B-B14F-4D97-AF65-F5344CB8AC3E}">
-        <p14:creationId xmlns:p14="http://schemas.microsoft.com/office/powerpoint/2010/main" val="3987862869"/>
+        <p14:creationId xmlns:p14="http://schemas.microsoft.com/office/powerpoint/2010/main" val="2549143281"/>
       </p:ext>
     </p:extLst>
   </p:cSld>
@@ -3715,7 +3987,7 @@
           <p:nvPr>
             <p:extLst>
               <p:ext uri="{D42A27DB-BD31-4B8C-83A1-F6EECF244321}">
-                <p14:modId xmlns:p14="http://schemas.microsoft.com/office/powerpoint/2010/main" val="2568728457"/>
+                <p14:modId xmlns:p14="http://schemas.microsoft.com/office/powerpoint/2010/main" val="3604518850"/>
               </p:ext>
             </p:extLst>
           </p:nvPr>
@@ -3785,7 +4057,7 @@
                     <a:p>
                       <a:r>
                         <a:rPr lang="en-US" dirty="0"/>
-                        <a:t>Easy</a:t>
+                        <a:t>Easy code</a:t>
                       </a:r>
                       <a:r>
                         <a:rPr lang="en-US" baseline="0" dirty="0"/>
@@ -3822,6 +4094,12 @@
                       <a:r>
                         <a:rPr lang="en-US" dirty="0"/>
                         <a:t>Easy deployment</a:t>
+                      </a:r>
+                    </a:p>
+                    <a:p>
+                      <a:r>
+                        <a:rPr lang="en-US" dirty="0"/>
+                        <a:t>And software updates</a:t>
                       </a:r>
                     </a:p>
                   </a:txBody>

</xml_diff>

<commit_message>
Michtava Presentation - final version (hopefully)
</commit_message>
<xml_diff>
--- a/Michtava - Presentation.pptx
+++ b/Michtava - Presentation.pptx
@@ -255,7 +255,7 @@
           <a:p>
             <a:fld id="{2415F1F3-3BD1-4C3C-972D-1C61D1AC7CDD}" type="datetimeFigureOut">
               <a:rPr lang="en-US" smtClean="0"/>
-              <a:t>6/18/2017</a:t>
+              <a:t>06/19/2017</a:t>
             </a:fld>
             <a:endParaRPr lang="en-US"/>
           </a:p>
@@ -423,7 +423,7 @@
           <a:p>
             <a:fld id="{2415F1F3-3BD1-4C3C-972D-1C61D1AC7CDD}" type="datetimeFigureOut">
               <a:rPr lang="en-US" smtClean="0"/>
-              <a:t>6/18/2017</a:t>
+              <a:t>06/19/2017</a:t>
             </a:fld>
             <a:endParaRPr lang="en-US"/>
           </a:p>
@@ -601,7 +601,7 @@
           <a:p>
             <a:fld id="{2415F1F3-3BD1-4C3C-972D-1C61D1AC7CDD}" type="datetimeFigureOut">
               <a:rPr lang="en-US" smtClean="0"/>
-              <a:t>6/18/2017</a:t>
+              <a:t>06/19/2017</a:t>
             </a:fld>
             <a:endParaRPr lang="en-US"/>
           </a:p>
@@ -769,7 +769,7 @@
           <a:p>
             <a:fld id="{2415F1F3-3BD1-4C3C-972D-1C61D1AC7CDD}" type="datetimeFigureOut">
               <a:rPr lang="en-US" smtClean="0"/>
-              <a:t>6/18/2017</a:t>
+              <a:t>06/19/2017</a:t>
             </a:fld>
             <a:endParaRPr lang="en-US"/>
           </a:p>
@@ -1014,7 +1014,7 @@
           <a:p>
             <a:fld id="{2415F1F3-3BD1-4C3C-972D-1C61D1AC7CDD}" type="datetimeFigureOut">
               <a:rPr lang="en-US" smtClean="0"/>
-              <a:t>6/18/2017</a:t>
+              <a:t>06/19/2017</a:t>
             </a:fld>
             <a:endParaRPr lang="en-US"/>
           </a:p>
@@ -1243,7 +1243,7 @@
           <a:p>
             <a:fld id="{2415F1F3-3BD1-4C3C-972D-1C61D1AC7CDD}" type="datetimeFigureOut">
               <a:rPr lang="en-US" smtClean="0"/>
-              <a:t>6/18/2017</a:t>
+              <a:t>06/19/2017</a:t>
             </a:fld>
             <a:endParaRPr lang="en-US"/>
           </a:p>
@@ -1607,7 +1607,7 @@
           <a:p>
             <a:fld id="{2415F1F3-3BD1-4C3C-972D-1C61D1AC7CDD}" type="datetimeFigureOut">
               <a:rPr lang="en-US" smtClean="0"/>
-              <a:t>6/18/2017</a:t>
+              <a:t>06/19/2017</a:t>
             </a:fld>
             <a:endParaRPr lang="en-US"/>
           </a:p>
@@ -1724,7 +1724,7 @@
           <a:p>
             <a:fld id="{2415F1F3-3BD1-4C3C-972D-1C61D1AC7CDD}" type="datetimeFigureOut">
               <a:rPr lang="en-US" smtClean="0"/>
-              <a:t>6/18/2017</a:t>
+              <a:t>06/19/2017</a:t>
             </a:fld>
             <a:endParaRPr lang="en-US"/>
           </a:p>
@@ -1819,7 +1819,7 @@
           <a:p>
             <a:fld id="{2415F1F3-3BD1-4C3C-972D-1C61D1AC7CDD}" type="datetimeFigureOut">
               <a:rPr lang="en-US" smtClean="0"/>
-              <a:t>6/18/2017</a:t>
+              <a:t>06/19/2017</a:t>
             </a:fld>
             <a:endParaRPr lang="en-US"/>
           </a:p>
@@ -2094,7 +2094,7 @@
           <a:p>
             <a:fld id="{2415F1F3-3BD1-4C3C-972D-1C61D1AC7CDD}" type="datetimeFigureOut">
               <a:rPr lang="en-US" smtClean="0"/>
-              <a:t>6/18/2017</a:t>
+              <a:t>06/19/2017</a:t>
             </a:fld>
             <a:endParaRPr lang="en-US"/>
           </a:p>
@@ -2346,7 +2346,7 @@
           <a:p>
             <a:fld id="{2415F1F3-3BD1-4C3C-972D-1C61D1AC7CDD}" type="datetimeFigureOut">
               <a:rPr lang="en-US" smtClean="0"/>
-              <a:t>6/18/2017</a:t>
+              <a:t>06/19/2017</a:t>
             </a:fld>
             <a:endParaRPr lang="en-US"/>
           </a:p>
@@ -2566,7 +2566,7 @@
           <a:p>
             <a:fld id="{2415F1F3-3BD1-4C3C-972D-1C61D1AC7CDD}" type="datetimeFigureOut">
               <a:rPr lang="en-US" smtClean="0"/>
-              <a:t>6/18/2017</a:t>
+              <a:t>06/19/2017</a:t>
             </a:fld>
             <a:endParaRPr lang="en-US"/>
           </a:p>
@@ -3262,8 +3262,8 @@
         </p:nvSpPr>
         <p:spPr>
           <a:xfrm>
-            <a:off x="1324252" y="1876298"/>
-            <a:ext cx="8194090" cy="1477328"/>
+            <a:off x="1381646" y="1523003"/>
+            <a:ext cx="8822925" cy="1754326"/>
           </a:xfrm>
           <a:prstGeom prst="rect">
             <a:avLst/>
@@ -3282,15 +3282,7 @@
             </a:pPr>
             <a:r>
               <a:rPr lang="en-US" dirty="0"/>
-              <a:t>Maintaining an updated RTM during </a:t>
-            </a:r>
-            <a:r>
-              <a:rPr lang="en-US" i="1" dirty="0"/>
-              <a:t>all</a:t>
-            </a:r>
-            <a:r>
-              <a:rPr lang="en-US" dirty="0"/>
-              <a:t> development phases helps keep the project “tight” and grants clarity as to the most pressing tasks to complete.</a:t>
+              <a:t>First time dealing with a large scale project management and development.</a:t>
             </a:r>
           </a:p>
           <a:p>
@@ -3300,13 +3292,8 @@
             </a:pPr>
             <a:r>
               <a:rPr lang="en-US" dirty="0"/>
-              <a:t>It’s good to have a “Common Troubleshooting” section within the project’s documentation – it may come to save dozens of hours worth </a:t>
-            </a:r>
-            <a:r>
-              <a:rPr lang="en-US"/>
-              <a:t>of debugging.</a:t>
-            </a:r>
-            <a:endParaRPr lang="en-US" dirty="0"/>
+              <a:t>Working tight with some documents was very helpful (RTM) and with some of them not.</a:t>
+            </a:r>
           </a:p>
           <a:p>
             <a:pPr marL="285750" indent="-285750">
@@ -3315,11 +3302,61 @@
             </a:pPr>
             <a:r>
               <a:rPr lang="en-US" dirty="0"/>
-              <a:t>3 </a:t>
-            </a:r>
-          </a:p>
-        </p:txBody>
-      </p:sp>
+              <a:t>Better UI planning could have caused less UI changes through the development and easier testing.</a:t>
+            </a:r>
+          </a:p>
+          <a:p>
+            <a:pPr marL="285750" indent="-285750">
+              <a:buFont typeface="Arial" panose="020B0604020202020204" pitchFamily="34" charset="0"/>
+              <a:buChar char="•"/>
+            </a:pPr>
+            <a:r>
+              <a:rPr lang="en-US" dirty="0"/>
+              <a:t>Good communication was needed and helped us to complete the project as planned.</a:t>
+            </a:r>
+          </a:p>
+          <a:p>
+            <a:pPr marL="285750" indent="-285750">
+              <a:buFont typeface="Arial" panose="020B0604020202020204" pitchFamily="34" charset="0"/>
+              <a:buChar char="•"/>
+            </a:pPr>
+            <a:r>
+              <a:rPr lang="en-US" dirty="0"/>
+              <a:t>The most important thing was keeping the team’s spirit.</a:t>
+            </a:r>
+          </a:p>
+        </p:txBody>
+      </p:sp>
+      <p:pic>
+        <p:nvPicPr>
+          <p:cNvPr id="3" name="Picture 2"/>
+          <p:cNvPicPr>
+            <a:picLocks noChangeAspect="1"/>
+          </p:cNvPicPr>
+          <p:nvPr/>
+        </p:nvPicPr>
+        <p:blipFill>
+          <a:blip r:embed="rId3">
+            <a:extLst>
+              <a:ext uri="{28A0092B-C50C-407E-A947-70E740481C1C}">
+                <a14:useLocalDpi xmlns:a14="http://schemas.microsoft.com/office/drawing/2010/main" val="0"/>
+              </a:ext>
+            </a:extLst>
+          </a:blip>
+          <a:stretch>
+            <a:fillRect/>
+          </a:stretch>
+        </p:blipFill>
+        <p:spPr>
+          <a:xfrm>
+            <a:off x="5096760" y="3582802"/>
+            <a:ext cx="2467015" cy="2467015"/>
+          </a:xfrm>
+          <a:prstGeom prst="rect">
+            <a:avLst/>
+          </a:prstGeom>
+        </p:spPr>
+      </p:pic>
     </p:spTree>
     <p:extLst>
       <p:ext uri="{BB962C8B-B14F-4D97-AF65-F5344CB8AC3E}">
@@ -4041,21 +4078,21 @@
       </p:sp>
       <p:graphicFrame>
         <p:nvGraphicFramePr>
-          <p:cNvPr id="28" name="Table 27"/>
+          <p:cNvPr id="9" name="Table 8"/>
           <p:cNvGraphicFramePr>
             <a:graphicFrameLocks noGrp="1"/>
           </p:cNvGraphicFramePr>
           <p:nvPr>
             <p:extLst>
               <p:ext uri="{D42A27DB-BD31-4B8C-83A1-F6EECF244321}">
-                <p14:modId xmlns:p14="http://schemas.microsoft.com/office/powerpoint/2010/main" val="3299662661"/>
+                <p14:modId xmlns:p14="http://schemas.microsoft.com/office/powerpoint/2010/main" val="2359571242"/>
               </p:ext>
             </p:extLst>
           </p:nvPr>
         </p:nvGraphicFramePr>
         <p:xfrm>
-          <a:off x="1225117" y="2166151"/>
-          <a:ext cx="9623395" cy="2221093"/>
+          <a:off x="1278152" y="2145116"/>
+          <a:ext cx="9602540" cy="2965185"/>
         </p:xfrm>
         <a:graphic>
           <a:graphicData uri="http://schemas.openxmlformats.org/drawingml/2006/table">
@@ -4064,35 +4101,35 @@
                 <a:tableStyleId>{5C22544A-7EE6-4342-B048-85BDC9FD1C3A}</a:tableStyleId>
               </a:tblPr>
               <a:tblGrid>
-                <a:gridCol w="1703430">
+                <a:gridCol w="1920508">
                   <a:extLst>
                     <a:ext uri="{9D8B030D-6E8A-4147-A177-3AD203B41FA5}">
                       <a16:colId xmlns:a16="http://schemas.microsoft.com/office/drawing/2014/main" val="830730418"/>
                     </a:ext>
                   </a:extLst>
                 </a:gridCol>
-                <a:gridCol w="1918806">
+                <a:gridCol w="1920508">
                   <a:extLst>
                     <a:ext uri="{9D8B030D-6E8A-4147-A177-3AD203B41FA5}">
                       <a16:colId xmlns:a16="http://schemas.microsoft.com/office/drawing/2014/main" val="3332653191"/>
                     </a:ext>
                   </a:extLst>
                 </a:gridCol>
-                <a:gridCol w="2151801">
+                <a:gridCol w="1920508">
                   <a:extLst>
                     <a:ext uri="{9D8B030D-6E8A-4147-A177-3AD203B41FA5}">
                       <a16:colId xmlns:a16="http://schemas.microsoft.com/office/drawing/2014/main" val="3200482868"/>
                     </a:ext>
                   </a:extLst>
                 </a:gridCol>
-                <a:gridCol w="1547910">
+                <a:gridCol w="1920508">
                   <a:extLst>
                     <a:ext uri="{9D8B030D-6E8A-4147-A177-3AD203B41FA5}">
                       <a16:colId xmlns:a16="http://schemas.microsoft.com/office/drawing/2014/main" val="119609396"/>
                     </a:ext>
                   </a:extLst>
                 </a:gridCol>
-                <a:gridCol w="2301448">
+                <a:gridCol w="1920508">
                   <a:extLst>
                     <a:ext uri="{9D8B030D-6E8A-4147-A177-3AD203B41FA5}">
                       <a16:colId xmlns:a16="http://schemas.microsoft.com/office/drawing/2014/main" val="762807193"/>
@@ -4100,7 +4137,7 @@
                   </a:extLst>
                 </a:gridCol>
               </a:tblGrid>
-              <a:tr h="1296140">
+              <a:tr h="1022076">
                 <a:tc>
                   <a:txBody>
                     <a:bodyPr/>
@@ -4116,15 +4153,22 @@
                     <a:bodyPr/>
                     <a:lstStyle/>
                     <a:p>
-                      <a:endParaRPr lang="en-US" dirty="0"/>
+                      <a:r>
+                        <a:rPr lang="en-US" dirty="0"/>
+                        <a:t>Entity Framework</a:t>
+                      </a:r>
                     </a:p>
-                    <a:p>
-                      <a:endParaRPr lang="en-US" dirty="0"/>
-                    </a:p>
+                  </a:txBody>
+                  <a:tcPr/>
+                </a:tc>
+                <a:tc>
+                  <a:txBody>
+                    <a:bodyPr/>
+                    <a:lstStyle/>
                     <a:p>
                       <a:r>
                         <a:rPr lang="en-US" dirty="0"/>
-                        <a:t>Orientation</a:t>
+                        <a:t>Availability for different devices and operating systems</a:t>
                       </a:r>
                       <a:r>
                         <a:rPr lang="en-US" baseline="0" dirty="0"/>
@@ -4140,78 +4184,15 @@
                     <a:bodyPr/>
                     <a:lstStyle/>
                     <a:p>
-                      <a:endParaRPr lang="en-US" dirty="0"/>
-                    </a:p>
-                    <a:p>
-                      <a:endParaRPr lang="en-US" dirty="0"/>
+                      <a:r>
+                        <a:rPr lang="en-US" dirty="0"/>
+                        <a:t>Easy deployment</a:t>
+                      </a:r>
                     </a:p>
                     <a:p>
                       <a:r>
                         <a:rPr lang="en-US" dirty="0"/>
-                        <a:t>Maturity</a:t>
-                      </a:r>
-                    </a:p>
-                  </a:txBody>
-                  <a:tcPr/>
-                </a:tc>
-                <a:tc>
-                  <a:txBody>
-                    <a:bodyPr/>
-                    <a:lstStyle/>
-                    <a:p>
-                      <a:endParaRPr lang="en-US" dirty="0"/>
-                    </a:p>
-                    <a:p>
-                      <a:r>
-                        <a:rPr lang="en-US" dirty="0"/>
-                        <a:t>Comfortable deployment</a:t>
-                      </a:r>
-                    </a:p>
-                  </a:txBody>
-                  <a:tcPr/>
-                </a:tc>
-                <a:tc>
-                  <a:txBody>
-                    <a:bodyPr/>
-                    <a:lstStyle/>
-                    <a:p>
-                      <a:endParaRPr lang="en-US" dirty="0"/>
-                    </a:p>
-                    <a:p>
-                      <a:r>
-                        <a:rPr lang="en-US" dirty="0"/>
-                        <a:t>Libraries and Extensions</a:t>
-                      </a:r>
-                    </a:p>
-                  </a:txBody>
-                  <a:tcPr/>
-                </a:tc>
-                <a:extLst>
-                  <a:ext uri="{0D108BD9-81ED-4DB2-BD59-A6C34878D82A}">
-                    <a16:rowId xmlns:a16="http://schemas.microsoft.com/office/drawing/2014/main" val="2863030803"/>
-                  </a:ext>
-                </a:extLst>
-              </a:tr>
-              <a:tr h="456076">
-                <a:tc>
-                  <a:txBody>
-                    <a:bodyPr/>
-                    <a:lstStyle/>
-                    <a:p>
-                      <a:pPr algn="ctr"/>
-                      <a:endParaRPr lang="en-US" b="1" dirty="0"/>
-                    </a:p>
-                  </a:txBody>
-                  <a:tcPr/>
-                </a:tc>
-                <a:tc>
-                  <a:txBody>
-                    <a:bodyPr/>
-                    <a:lstStyle/>
-                    <a:p>
-                      <a:r>
-                        <a:rPr lang="en-US" dirty="0"/>
-                        <a:t>Event Oriented</a:t>
+                        <a:t>And software updates</a:t>
                       </a:r>
                     </a:p>
                   </a:txBody>
@@ -4224,8 +4205,26 @@
                     <a:p>
                       <a:r>
                         <a:rPr lang="en-US" dirty="0"/>
-                        <a:t>Less than a decade</a:t>
+                        <a:t>Easy use of libraries and extensions</a:t>
                       </a:r>
+                    </a:p>
+                  </a:txBody>
+                  <a:tcPr/>
+                </a:tc>
+                <a:extLst>
+                  <a:ext uri="{0D108BD9-81ED-4DB2-BD59-A6C34878D82A}">
+                    <a16:rowId xmlns:a16="http://schemas.microsoft.com/office/drawing/2014/main" val="2863030803"/>
+                  </a:ext>
+                </a:extLst>
+              </a:tr>
+              <a:tr h="592155">
+                <a:tc>
+                  <a:txBody>
+                    <a:bodyPr/>
+                    <a:lstStyle/>
+                    <a:p>
+                      <a:pPr algn="ctr"/>
+                      <a:endParaRPr lang="en-US" b="1" dirty="0"/>
                     </a:p>
                   </a:txBody>
                   <a:tcPr/>
@@ -4245,21 +4244,38 @@
                     <a:bodyPr/>
                     <a:lstStyle/>
                     <a:p>
-                      <a:r>
-                        <a:rPr lang="en-US" dirty="0"/>
-                        <a:t>Scarce(in comparison) </a:t>
-                      </a:r>
+                      <a:endParaRPr lang="en-US"/>
+                    </a:p>
+                  </a:txBody>
+                  <a:tcPr/>
+                </a:tc>
+                <a:tc>
+                  <a:txBody>
+                    <a:bodyPr/>
+                    <a:lstStyle/>
+                    <a:p>
+                      <a:endParaRPr lang="en-US"/>
+                    </a:p>
+                  </a:txBody>
+                  <a:tcPr/>
+                </a:tc>
+                <a:tc>
+                  <a:txBody>
+                    <a:bodyPr/>
+                    <a:lstStyle/>
+                    <a:p>
+                      <a:endParaRPr lang="en-US"/>
                     </a:p>
                   </a:txBody>
                   <a:tcPr/>
                 </a:tc>
                 <a:extLst>
                   <a:ext uri="{0D108BD9-81ED-4DB2-BD59-A6C34878D82A}">
-                    <a16:rowId xmlns:a16="http://schemas.microsoft.com/office/drawing/2014/main" val="3102869371"/>
+                    <a16:rowId xmlns:a16="http://schemas.microsoft.com/office/drawing/2014/main" val="1927753291"/>
                   </a:ext>
                 </a:extLst>
               </a:tr>
-              <a:tr h="468877">
+              <a:tr h="592155">
                 <a:tc>
                   <a:txBody>
                     <a:bodyPr/>
@@ -4276,10 +4292,7 @@
                     <a:bodyPr/>
                     <a:lstStyle/>
                     <a:p>
-                      <a:r>
-                        <a:rPr lang="en-US" dirty="0"/>
-                        <a:t>Object Oriented</a:t>
-                      </a:r>
+                      <a:endParaRPr lang="en-US"/>
                     </a:p>
                   </a:txBody>
                   <a:tcPr/>
@@ -4289,10 +4302,75 @@
                     <a:bodyPr/>
                     <a:lstStyle/>
                     <a:p>
-                      <a:r>
-                        <a:rPr lang="en-US" dirty="0"/>
-                        <a:t>Nearly 2 decades</a:t>
-                      </a:r>
+                      <a:endParaRPr lang="en-US"/>
+                    </a:p>
+                  </a:txBody>
+                  <a:tcPr/>
+                </a:tc>
+                <a:tc>
+                  <a:txBody>
+                    <a:bodyPr/>
+                    <a:lstStyle/>
+                    <a:p>
+                      <a:endParaRPr lang="en-US"/>
+                    </a:p>
+                  </a:txBody>
+                  <a:tcPr/>
+                </a:tc>
+                <a:tc>
+                  <a:txBody>
+                    <a:bodyPr/>
+                    <a:lstStyle/>
+                    <a:p>
+                      <a:endParaRPr lang="en-US"/>
+                    </a:p>
+                  </a:txBody>
+                  <a:tcPr/>
+                </a:tc>
+                <a:extLst>
+                  <a:ext uri="{0D108BD9-81ED-4DB2-BD59-A6C34878D82A}">
+                    <a16:rowId xmlns:a16="http://schemas.microsoft.com/office/drawing/2014/main" val="925744985"/>
+                  </a:ext>
+                </a:extLst>
+              </a:tr>
+              <a:tr h="592155">
+                <a:tc>
+                  <a:txBody>
+                    <a:bodyPr/>
+                    <a:lstStyle/>
+                    <a:p>
+                      <a:pPr algn="ctr"/>
+                      <a:endParaRPr lang="en-US" b="1" dirty="0"/>
+                    </a:p>
+                  </a:txBody>
+                  <a:tcPr/>
+                </a:tc>
+                <a:tc>
+                  <a:txBody>
+                    <a:bodyPr/>
+                    <a:lstStyle/>
+                    <a:p>
+                      <a:endParaRPr lang="en-US"/>
+                    </a:p>
+                  </a:txBody>
+                  <a:tcPr/>
+                </a:tc>
+                <a:tc>
+                  <a:txBody>
+                    <a:bodyPr/>
+                    <a:lstStyle/>
+                    <a:p>
+                      <a:endParaRPr lang="en-US"/>
+                    </a:p>
+                  </a:txBody>
+                  <a:tcPr/>
+                </a:tc>
+                <a:tc>
+                  <a:txBody>
+                    <a:bodyPr/>
+                    <a:lstStyle/>
+                    <a:p>
+                      <a:endParaRPr lang="en-US"/>
                     </a:p>
                   </a:txBody>
                   <a:tcPr/>
@@ -4307,22 +4385,9 @@
                   </a:txBody>
                   <a:tcPr/>
                 </a:tc>
-                <a:tc>
-                  <a:txBody>
-                    <a:bodyPr/>
-                    <a:lstStyle/>
-                    <a:p>
-                      <a:r>
-                        <a:rPr lang="en-US" dirty="0"/>
-                        <a:t>Abundant</a:t>
-                      </a:r>
-                    </a:p>
-                  </a:txBody>
-                  <a:tcPr/>
-                </a:tc>
                 <a:extLst>
                   <a:ext uri="{0D108BD9-81ED-4DB2-BD59-A6C34878D82A}">
-                    <a16:rowId xmlns:a16="http://schemas.microsoft.com/office/drawing/2014/main" val="1927753291"/>
+                    <a16:rowId xmlns:a16="http://schemas.microsoft.com/office/drawing/2014/main" val="4074076918"/>
                   </a:ext>
                 </a:extLst>
               </a:tr>
@@ -4332,7 +4397,7 @@
       </p:graphicFrame>
       <p:pic>
         <p:nvPicPr>
-          <p:cNvPr id="29" name="Picture 28"/>
+          <p:cNvPr id="10" name="Picture 9"/>
           <p:cNvPicPr>
             <a:picLocks noChangeAspect="1"/>
           </p:cNvPicPr>
@@ -4352,7 +4417,7 @@
         </p:blipFill>
         <p:spPr>
           <a:xfrm>
-            <a:off x="7576089" y="3540050"/>
+            <a:off x="5885868" y="4052696"/>
             <a:ext cx="301841" cy="301841"/>
           </a:xfrm>
           <a:prstGeom prst="rect">
@@ -4362,7 +4427,67 @@
       </p:pic>
       <p:pic>
         <p:nvPicPr>
-          <p:cNvPr id="30" name="Picture 29"/>
+          <p:cNvPr id="11" name="Picture 10"/>
+          <p:cNvPicPr>
+            <a:picLocks noChangeAspect="1"/>
+          </p:cNvPicPr>
+          <p:nvPr/>
+        </p:nvPicPr>
+        <p:blipFill>
+          <a:blip r:embed="rId3">
+            <a:extLst>
+              <a:ext uri="{28A0092B-C50C-407E-A947-70E740481C1C}">
+                <a14:useLocalDpi xmlns:a14="http://schemas.microsoft.com/office/drawing/2010/main" val="0"/>
+              </a:ext>
+            </a:extLst>
+          </a:blip>
+          <a:stretch>
+            <a:fillRect/>
+          </a:stretch>
+        </p:blipFill>
+        <p:spPr>
+          <a:xfrm>
+            <a:off x="9697347" y="3469014"/>
+            <a:ext cx="301841" cy="301841"/>
+          </a:xfrm>
+          <a:prstGeom prst="rect">
+            <a:avLst/>
+          </a:prstGeom>
+        </p:spPr>
+      </p:pic>
+      <p:pic>
+        <p:nvPicPr>
+          <p:cNvPr id="13" name="Picture 12"/>
+          <p:cNvPicPr>
+            <a:picLocks noChangeAspect="1"/>
+          </p:cNvPicPr>
+          <p:nvPr/>
+        </p:nvPicPr>
+        <p:blipFill>
+          <a:blip r:embed="rId3">
+            <a:extLst>
+              <a:ext uri="{28A0092B-C50C-407E-A947-70E740481C1C}">
+                <a14:useLocalDpi xmlns:a14="http://schemas.microsoft.com/office/drawing/2010/main" val="0"/>
+              </a:ext>
+            </a:extLst>
+          </a:blip>
+          <a:stretch>
+            <a:fillRect/>
+          </a:stretch>
+        </p:blipFill>
+        <p:spPr>
+          <a:xfrm>
+            <a:off x="3961498" y="3531255"/>
+            <a:ext cx="301841" cy="301841"/>
+          </a:xfrm>
+          <a:prstGeom prst="rect">
+            <a:avLst/>
+          </a:prstGeom>
+        </p:spPr>
+      </p:pic>
+      <p:pic>
+        <p:nvPicPr>
+          <p:cNvPr id="15" name="Picture 14"/>
           <p:cNvPicPr>
             <a:picLocks noChangeAspect="1"/>
           </p:cNvPicPr>
@@ -4382,7 +4507,7 @@
         </p:blipFill>
         <p:spPr>
           <a:xfrm>
-            <a:off x="7490031" y="3934367"/>
+            <a:off x="3881228" y="4545513"/>
             <a:ext cx="473955" cy="473955"/>
           </a:xfrm>
           <a:prstGeom prst="rect">
@@ -4392,7 +4517,247 @@
       </p:pic>
       <p:pic>
         <p:nvPicPr>
-          <p:cNvPr id="31" name="Picture 30"/>
+          <p:cNvPr id="16" name="Picture 15"/>
+          <p:cNvPicPr>
+            <a:picLocks noChangeAspect="1"/>
+          </p:cNvPicPr>
+          <p:nvPr/>
+        </p:nvPicPr>
+        <p:blipFill>
+          <a:blip r:embed="rId4">
+            <a:extLst>
+              <a:ext uri="{28A0092B-C50C-407E-A947-70E740481C1C}">
+                <a14:useLocalDpi xmlns:a14="http://schemas.microsoft.com/office/drawing/2010/main" val="0"/>
+              </a:ext>
+            </a:extLst>
+          </a:blip>
+          <a:stretch>
+            <a:fillRect/>
+          </a:stretch>
+        </p:blipFill>
+        <p:spPr>
+          <a:xfrm>
+            <a:off x="3881228" y="3978804"/>
+            <a:ext cx="473955" cy="473955"/>
+          </a:xfrm>
+          <a:prstGeom prst="rect">
+            <a:avLst/>
+          </a:prstGeom>
+        </p:spPr>
+      </p:pic>
+      <p:pic>
+        <p:nvPicPr>
+          <p:cNvPr id="17" name="Picture 16"/>
+          <p:cNvPicPr>
+            <a:picLocks noChangeAspect="1"/>
+          </p:cNvPicPr>
+          <p:nvPr/>
+        </p:nvPicPr>
+        <p:blipFill>
+          <a:blip r:embed="rId4">
+            <a:extLst>
+              <a:ext uri="{28A0092B-C50C-407E-A947-70E740481C1C}">
+                <a14:useLocalDpi xmlns:a14="http://schemas.microsoft.com/office/drawing/2010/main" val="0"/>
+              </a:ext>
+            </a:extLst>
+          </a:blip>
+          <a:stretch>
+            <a:fillRect/>
+          </a:stretch>
+        </p:blipFill>
+        <p:spPr>
+          <a:xfrm>
+            <a:off x="9629320" y="4524542"/>
+            <a:ext cx="473955" cy="473955"/>
+          </a:xfrm>
+          <a:prstGeom prst="rect">
+            <a:avLst/>
+          </a:prstGeom>
+        </p:spPr>
+      </p:pic>
+      <p:pic>
+        <p:nvPicPr>
+          <p:cNvPr id="18" name="Picture 17"/>
+          <p:cNvPicPr>
+            <a:picLocks noChangeAspect="1"/>
+          </p:cNvPicPr>
+          <p:nvPr/>
+        </p:nvPicPr>
+        <p:blipFill>
+          <a:blip r:embed="rId4">
+            <a:extLst>
+              <a:ext uri="{28A0092B-C50C-407E-A947-70E740481C1C}">
+                <a14:useLocalDpi xmlns:a14="http://schemas.microsoft.com/office/drawing/2010/main" val="0"/>
+              </a:ext>
+            </a:extLst>
+          </a:blip>
+          <a:stretch>
+            <a:fillRect/>
+          </a:stretch>
+        </p:blipFill>
+        <p:spPr>
+          <a:xfrm>
+            <a:off x="7732622" y="4531518"/>
+            <a:ext cx="473955" cy="473955"/>
+          </a:xfrm>
+          <a:prstGeom prst="rect">
+            <a:avLst/>
+          </a:prstGeom>
+        </p:spPr>
+      </p:pic>
+      <p:pic>
+        <p:nvPicPr>
+          <p:cNvPr id="19" name="Picture 18"/>
+          <p:cNvPicPr>
+            <a:picLocks noChangeAspect="1"/>
+          </p:cNvPicPr>
+          <p:nvPr/>
+        </p:nvPicPr>
+        <p:blipFill>
+          <a:blip r:embed="rId4">
+            <a:extLst>
+              <a:ext uri="{28A0092B-C50C-407E-A947-70E740481C1C}">
+                <a14:useLocalDpi xmlns:a14="http://schemas.microsoft.com/office/drawing/2010/main" val="0"/>
+              </a:ext>
+            </a:extLst>
+          </a:blip>
+          <a:stretch>
+            <a:fillRect/>
+          </a:stretch>
+        </p:blipFill>
+        <p:spPr>
+          <a:xfrm>
+            <a:off x="5835924" y="4545513"/>
+            <a:ext cx="473955" cy="473955"/>
+          </a:xfrm>
+          <a:prstGeom prst="rect">
+            <a:avLst/>
+          </a:prstGeom>
+        </p:spPr>
+      </p:pic>
+      <p:pic>
+        <p:nvPicPr>
+          <p:cNvPr id="20" name="Picture 19"/>
+          <p:cNvPicPr>
+            <a:picLocks noChangeAspect="1"/>
+          </p:cNvPicPr>
+          <p:nvPr/>
+        </p:nvPicPr>
+        <p:blipFill>
+          <a:blip r:embed="rId4">
+            <a:extLst>
+              <a:ext uri="{28A0092B-C50C-407E-A947-70E740481C1C}">
+                <a14:useLocalDpi xmlns:a14="http://schemas.microsoft.com/office/drawing/2010/main" val="0"/>
+              </a:ext>
+            </a:extLst>
+          </a:blip>
+          <a:stretch>
+            <a:fillRect/>
+          </a:stretch>
+        </p:blipFill>
+        <p:spPr>
+          <a:xfrm>
+            <a:off x="9611289" y="3948209"/>
+            <a:ext cx="473955" cy="473955"/>
+          </a:xfrm>
+          <a:prstGeom prst="rect">
+            <a:avLst/>
+          </a:prstGeom>
+        </p:spPr>
+      </p:pic>
+      <p:pic>
+        <p:nvPicPr>
+          <p:cNvPr id="21" name="Picture 20"/>
+          <p:cNvPicPr>
+            <a:picLocks noChangeAspect="1"/>
+          </p:cNvPicPr>
+          <p:nvPr/>
+        </p:nvPicPr>
+        <p:blipFill>
+          <a:blip r:embed="rId3">
+            <a:extLst>
+              <a:ext uri="{28A0092B-C50C-407E-A947-70E740481C1C}">
+                <a14:useLocalDpi xmlns:a14="http://schemas.microsoft.com/office/drawing/2010/main" val="0"/>
+              </a:ext>
+            </a:extLst>
+          </a:blip>
+          <a:stretch>
+            <a:fillRect/>
+          </a:stretch>
+        </p:blipFill>
+        <p:spPr>
+          <a:xfrm>
+            <a:off x="7832433" y="4052346"/>
+            <a:ext cx="301841" cy="301841"/>
+          </a:xfrm>
+          <a:prstGeom prst="rect">
+            <a:avLst/>
+          </a:prstGeom>
+        </p:spPr>
+      </p:pic>
+      <p:pic>
+        <p:nvPicPr>
+          <p:cNvPr id="23" name="Picture 22"/>
+          <p:cNvPicPr>
+            <a:picLocks noChangeAspect="1"/>
+          </p:cNvPicPr>
+          <p:nvPr/>
+        </p:nvPicPr>
+        <p:blipFill>
+          <a:blip r:embed="rId4">
+            <a:extLst>
+              <a:ext uri="{28A0092B-C50C-407E-A947-70E740481C1C}">
+                <a14:useLocalDpi xmlns:a14="http://schemas.microsoft.com/office/drawing/2010/main" val="0"/>
+              </a:ext>
+            </a:extLst>
+          </a:blip>
+          <a:stretch>
+            <a:fillRect/>
+          </a:stretch>
+        </p:blipFill>
+        <p:spPr>
+          <a:xfrm>
+            <a:off x="5842445" y="3387765"/>
+            <a:ext cx="473955" cy="473955"/>
+          </a:xfrm>
+          <a:prstGeom prst="rect">
+            <a:avLst/>
+          </a:prstGeom>
+        </p:spPr>
+      </p:pic>
+      <p:pic>
+        <p:nvPicPr>
+          <p:cNvPr id="25" name="Picture 24"/>
+          <p:cNvPicPr>
+            <a:picLocks noChangeAspect="1"/>
+          </p:cNvPicPr>
+          <p:nvPr/>
+        </p:nvPicPr>
+        <p:blipFill>
+          <a:blip r:embed="rId4">
+            <a:extLst>
+              <a:ext uri="{28A0092B-C50C-407E-A947-70E740481C1C}">
+                <a14:useLocalDpi xmlns:a14="http://schemas.microsoft.com/office/drawing/2010/main" val="0"/>
+              </a:ext>
+            </a:extLst>
+          </a:blip>
+          <a:stretch>
+            <a:fillRect/>
+          </a:stretch>
+        </p:blipFill>
+        <p:spPr>
+          <a:xfrm>
+            <a:off x="7746374" y="3371853"/>
+            <a:ext cx="473955" cy="473955"/>
+          </a:xfrm>
+          <a:prstGeom prst="rect">
+            <a:avLst/>
+          </a:prstGeom>
+        </p:spPr>
+      </p:pic>
+      <p:pic>
+        <p:nvPicPr>
+          <p:cNvPr id="26" name="Picture 25"/>
           <p:cNvPicPr>
             <a:picLocks noChangeAspect="1"/>
           </p:cNvPicPr>
@@ -4412,7 +4777,7 @@
         </p:blipFill>
         <p:spPr>
           <a:xfrm>
-            <a:off x="1570334" y="3880067"/>
+            <a:off x="1729023" y="4538536"/>
             <a:ext cx="990478" cy="528255"/>
           </a:xfrm>
           <a:prstGeom prst="rect">
@@ -4443,8 +4808,8 @@
         </p:blipFill>
         <p:spPr bwMode="auto">
           <a:xfrm>
-            <a:off x="1532330" y="3040131"/>
-            <a:ext cx="1275425" cy="1275425"/>
+            <a:off x="1682751" y="3066182"/>
+            <a:ext cx="1107505" cy="1107505"/>
           </a:xfrm>
           <a:prstGeom prst="rect">
             <a:avLst/>
@@ -4459,6 +4824,36 @@
               </a14:hiddenFill>
             </a:ext>
           </a:extLst>
+        </p:spPr>
+      </p:pic>
+      <p:pic>
+        <p:nvPicPr>
+          <p:cNvPr id="3" name="Picture 2"/>
+          <p:cNvPicPr>
+            <a:picLocks noChangeAspect="1"/>
+          </p:cNvPicPr>
+          <p:nvPr/>
+        </p:nvPicPr>
+        <p:blipFill>
+          <a:blip r:embed="rId7">
+            <a:extLst>
+              <a:ext uri="{28A0092B-C50C-407E-A947-70E740481C1C}">
+                <a14:useLocalDpi xmlns:a14="http://schemas.microsoft.com/office/drawing/2010/main" val="0"/>
+              </a:ext>
+            </a:extLst>
+          </a:blip>
+          <a:stretch>
+            <a:fillRect/>
+          </a:stretch>
+        </p:blipFill>
+        <p:spPr>
+          <a:xfrm>
+            <a:off x="1799375" y="3978804"/>
+            <a:ext cx="833322" cy="524684"/>
+          </a:xfrm>
+          <a:prstGeom prst="rect">
+            <a:avLst/>
+          </a:prstGeom>
         </p:spPr>
       </p:pic>
     </p:spTree>
@@ -4975,7 +5370,7 @@
         </p:nvSpPr>
         <p:spPr>
           <a:xfrm>
-            <a:off x="469880" y="1908685"/>
+            <a:off x="469880" y="1713377"/>
             <a:ext cx="7679821" cy="646331"/>
           </a:xfrm>
           <a:prstGeom prst="rect">
@@ -5053,7 +5448,7 @@
         </p:nvSpPr>
         <p:spPr>
           <a:xfrm>
-            <a:off x="469880" y="3039164"/>
+            <a:off x="469880" y="2772834"/>
             <a:ext cx="8194090" cy="1754326"/>
           </a:xfrm>
           <a:prstGeom prst="rect">
@@ -5106,21 +5501,41 @@
             </a:pPr>
             <a:r>
               <a:rPr lang="en-US" dirty="0"/>
-              <a:t>Makes changing the data model very comfortable and </a:t>
-            </a:r>
-          </a:p>
-          <a:p>
-            <a:pPr marL="285750" indent="-285750">
-              <a:buFont typeface="Arial" panose="020B0604020202020204" pitchFamily="34" charset="0"/>
-              <a:buChar char="•"/>
-            </a:pPr>
-            <a:r>
-              <a:rPr lang="en-US" dirty="0"/>
-              <a:t>        viable even late in development.</a:t>
-            </a:r>
-          </a:p>
-        </p:txBody>
-      </p:sp>
+              <a:t>Makes changing the data model very comfortable and viable even late in development and after releasing to the customer</a:t>
+            </a:r>
+          </a:p>
+        </p:txBody>
+      </p:sp>
+      <p:pic>
+        <p:nvPicPr>
+          <p:cNvPr id="3" name="Picture 2"/>
+          <p:cNvPicPr>
+            <a:picLocks noChangeAspect="1"/>
+          </p:cNvPicPr>
+          <p:nvPr/>
+        </p:nvPicPr>
+        <p:blipFill>
+          <a:blip r:embed="rId3">
+            <a:extLst>
+              <a:ext uri="{28A0092B-C50C-407E-A947-70E740481C1C}">
+                <a14:useLocalDpi xmlns:a14="http://schemas.microsoft.com/office/drawing/2010/main" val="0"/>
+              </a:ext>
+            </a:extLst>
+          </a:blip>
+          <a:stretch>
+            <a:fillRect/>
+          </a:stretch>
+        </p:blipFill>
+        <p:spPr>
+          <a:xfrm>
+            <a:off x="8149701" y="2516382"/>
+            <a:ext cx="2085616" cy="2085616"/>
+          </a:xfrm>
+          <a:prstGeom prst="rect">
+            <a:avLst/>
+          </a:prstGeom>
+        </p:spPr>
+      </p:pic>
     </p:spTree>
     <p:extLst>
       <p:ext uri="{BB962C8B-B14F-4D97-AF65-F5344CB8AC3E}">

</xml_diff>

<commit_message>
Michtava Presentation - final version (after fixes)
</commit_message>
<xml_diff>
--- a/Michtava - Presentation.pptx
+++ b/Michtava - Presentation.pptx
@@ -15,7 +15,8 @@
     <p:sldId id="259" r:id="rId9"/>
     <p:sldId id="262" r:id="rId10"/>
     <p:sldId id="266" r:id="rId11"/>
-    <p:sldId id="263" r:id="rId12"/>
+    <p:sldId id="269" r:id="rId12"/>
+    <p:sldId id="263" r:id="rId13"/>
   </p:sldIdLst>
   <p:sldSz cx="12192000" cy="6858000"/>
   <p:notesSz cx="6858000" cy="9144000"/>
@@ -255,7 +256,7 @@
           <a:p>
             <a:fld id="{2415F1F3-3BD1-4C3C-972D-1C61D1AC7CDD}" type="datetimeFigureOut">
               <a:rPr lang="en-US" smtClean="0"/>
-              <a:t>06/19/2017</a:t>
+              <a:t>06/20/2017</a:t>
             </a:fld>
             <a:endParaRPr lang="en-US"/>
           </a:p>
@@ -423,7 +424,7 @@
           <a:p>
             <a:fld id="{2415F1F3-3BD1-4C3C-972D-1C61D1AC7CDD}" type="datetimeFigureOut">
               <a:rPr lang="en-US" smtClean="0"/>
-              <a:t>06/19/2017</a:t>
+              <a:t>06/20/2017</a:t>
             </a:fld>
             <a:endParaRPr lang="en-US"/>
           </a:p>
@@ -601,7 +602,7 @@
           <a:p>
             <a:fld id="{2415F1F3-3BD1-4C3C-972D-1C61D1AC7CDD}" type="datetimeFigureOut">
               <a:rPr lang="en-US" smtClean="0"/>
-              <a:t>06/19/2017</a:t>
+              <a:t>06/20/2017</a:t>
             </a:fld>
             <a:endParaRPr lang="en-US"/>
           </a:p>
@@ -769,7 +770,7 @@
           <a:p>
             <a:fld id="{2415F1F3-3BD1-4C3C-972D-1C61D1AC7CDD}" type="datetimeFigureOut">
               <a:rPr lang="en-US" smtClean="0"/>
-              <a:t>06/19/2017</a:t>
+              <a:t>06/20/2017</a:t>
             </a:fld>
             <a:endParaRPr lang="en-US"/>
           </a:p>
@@ -1014,7 +1015,7 @@
           <a:p>
             <a:fld id="{2415F1F3-3BD1-4C3C-972D-1C61D1AC7CDD}" type="datetimeFigureOut">
               <a:rPr lang="en-US" smtClean="0"/>
-              <a:t>06/19/2017</a:t>
+              <a:t>06/20/2017</a:t>
             </a:fld>
             <a:endParaRPr lang="en-US"/>
           </a:p>
@@ -1243,7 +1244,7 @@
           <a:p>
             <a:fld id="{2415F1F3-3BD1-4C3C-972D-1C61D1AC7CDD}" type="datetimeFigureOut">
               <a:rPr lang="en-US" smtClean="0"/>
-              <a:t>06/19/2017</a:t>
+              <a:t>06/20/2017</a:t>
             </a:fld>
             <a:endParaRPr lang="en-US"/>
           </a:p>
@@ -1607,7 +1608,7 @@
           <a:p>
             <a:fld id="{2415F1F3-3BD1-4C3C-972D-1C61D1AC7CDD}" type="datetimeFigureOut">
               <a:rPr lang="en-US" smtClean="0"/>
-              <a:t>06/19/2017</a:t>
+              <a:t>06/20/2017</a:t>
             </a:fld>
             <a:endParaRPr lang="en-US"/>
           </a:p>
@@ -1724,7 +1725,7 @@
           <a:p>
             <a:fld id="{2415F1F3-3BD1-4C3C-972D-1C61D1AC7CDD}" type="datetimeFigureOut">
               <a:rPr lang="en-US" smtClean="0"/>
-              <a:t>06/19/2017</a:t>
+              <a:t>06/20/2017</a:t>
             </a:fld>
             <a:endParaRPr lang="en-US"/>
           </a:p>
@@ -1819,7 +1820,7 @@
           <a:p>
             <a:fld id="{2415F1F3-3BD1-4C3C-972D-1C61D1AC7CDD}" type="datetimeFigureOut">
               <a:rPr lang="en-US" smtClean="0"/>
-              <a:t>06/19/2017</a:t>
+              <a:t>06/20/2017</a:t>
             </a:fld>
             <a:endParaRPr lang="en-US"/>
           </a:p>
@@ -2094,7 +2095,7 @@
           <a:p>
             <a:fld id="{2415F1F3-3BD1-4C3C-972D-1C61D1AC7CDD}" type="datetimeFigureOut">
               <a:rPr lang="en-US" smtClean="0"/>
-              <a:t>06/19/2017</a:t>
+              <a:t>06/20/2017</a:t>
             </a:fld>
             <a:endParaRPr lang="en-US"/>
           </a:p>
@@ -2346,7 +2347,7 @@
           <a:p>
             <a:fld id="{2415F1F3-3BD1-4C3C-972D-1C61D1AC7CDD}" type="datetimeFigureOut">
               <a:rPr lang="en-US" smtClean="0"/>
-              <a:t>06/19/2017</a:t>
+              <a:t>06/20/2017</a:t>
             </a:fld>
             <a:endParaRPr lang="en-US"/>
           </a:p>
@@ -2566,7 +2567,7 @@
           <a:p>
             <a:fld id="{2415F1F3-3BD1-4C3C-972D-1C61D1AC7CDD}" type="datetimeFigureOut">
               <a:rPr lang="en-US" smtClean="0"/>
-              <a:t>06/19/2017</a:t>
+              <a:t>06/20/2017</a:t>
             </a:fld>
             <a:endParaRPr lang="en-US"/>
           </a:p>
@@ -3010,7 +3011,7 @@
         <p:spPr>
           <a:xfrm>
             <a:off x="7770538" y="3318353"/>
-            <a:ext cx="2361461" cy="1200329"/>
+            <a:ext cx="2361461" cy="1569660"/>
           </a:xfrm>
           <a:prstGeom prst="rect">
             <a:avLst/>
@@ -3025,31 +3026,31 @@
           <a:p>
             <a:pPr algn="ctr"/>
             <a:r>
-              <a:rPr lang="he-IL" b="1" u="sng" dirty="0"/>
+              <a:rPr lang="he-IL" sz="2400" b="1" u="sng" dirty="0"/>
               <a:t>סטודנטים:</a:t>
             </a:r>
           </a:p>
           <a:p>
             <a:pPr algn="ctr"/>
             <a:r>
-              <a:rPr lang="he-IL" dirty="0"/>
+              <a:rPr lang="he-IL" sz="2400" dirty="0"/>
               <a:t>שי דיין</a:t>
             </a:r>
           </a:p>
           <a:p>
             <a:pPr algn="ctr"/>
             <a:r>
-              <a:rPr lang="he-IL" dirty="0"/>
+              <a:rPr lang="he-IL" sz="2400" dirty="0"/>
               <a:t>רועי פילר</a:t>
             </a:r>
           </a:p>
           <a:p>
             <a:pPr algn="ctr"/>
             <a:r>
-              <a:rPr lang="he-IL" dirty="0"/>
+              <a:rPr lang="he-IL" sz="2400" dirty="0"/>
               <a:t>מגל וייס</a:t>
             </a:r>
-            <a:endParaRPr lang="en-US" dirty="0"/>
+            <a:endParaRPr lang="en-US" sz="2400" dirty="0"/>
           </a:p>
         </p:txBody>
       </p:sp>
@@ -3062,7 +3063,7 @@
         <p:spPr>
           <a:xfrm>
             <a:off x="5280242" y="3318353"/>
-            <a:ext cx="2361461" cy="923330"/>
+            <a:ext cx="2361461" cy="1200329"/>
           </a:xfrm>
           <a:prstGeom prst="rect">
             <a:avLst/>
@@ -3077,24 +3078,24 @@
           <a:p>
             <a:pPr algn="ctr"/>
             <a:r>
-              <a:rPr lang="he-IL" b="1" u="sng" dirty="0"/>
+              <a:rPr lang="he-IL" sz="2400" b="1" u="sng" dirty="0"/>
               <a:t>מנחים אקדמים:</a:t>
             </a:r>
           </a:p>
           <a:p>
             <a:pPr algn="ctr"/>
             <a:r>
-              <a:rPr lang="he-IL" dirty="0"/>
+              <a:rPr lang="he-IL" sz="2400" dirty="0"/>
               <a:t>ד"ר ארנון שטורם</a:t>
             </a:r>
           </a:p>
           <a:p>
             <a:pPr algn="ctr"/>
             <a:r>
-              <a:rPr lang="he-IL" dirty="0"/>
+              <a:rPr lang="he-IL" sz="2400" dirty="0"/>
               <a:t>ד"ר יוסי אורן</a:t>
             </a:r>
-            <a:endParaRPr lang="en-US" dirty="0"/>
+            <a:endParaRPr lang="en-US" sz="2400" dirty="0"/>
           </a:p>
         </p:txBody>
       </p:sp>
@@ -3107,7 +3108,7 @@
         <p:spPr>
           <a:xfrm>
             <a:off x="2457143" y="3318353"/>
-            <a:ext cx="2361461" cy="646331"/>
+            <a:ext cx="2361461" cy="1200329"/>
           </a:xfrm>
           <a:prstGeom prst="rect">
             <a:avLst/>
@@ -3122,17 +3123,17 @@
           <a:p>
             <a:pPr algn="ctr"/>
             <a:r>
-              <a:rPr lang="he-IL" b="1" u="sng" dirty="0"/>
+              <a:rPr lang="he-IL" sz="2400" b="1" u="sng" dirty="0"/>
               <a:t>מנחה מקצועית:</a:t>
             </a:r>
           </a:p>
           <a:p>
             <a:pPr algn="ctr"/>
             <a:r>
-              <a:rPr lang="he-IL" dirty="0"/>
+              <a:rPr lang="he-IL" sz="2400" dirty="0"/>
               <a:t>טליה מרמור בן רעי</a:t>
             </a:r>
-            <a:endParaRPr lang="en-US" dirty="0"/>
+            <a:endParaRPr lang="en-US" sz="2400" dirty="0"/>
           </a:p>
         </p:txBody>
       </p:sp>
@@ -3150,7 +3151,7 @@
 </file>
 
 <file path=ppt/slides/slide10.xml><?xml version="1.0" encoding="utf-8"?>
-<p:sld xmlns:a="http://schemas.openxmlformats.org/drawingml/2006/main" xmlns:r="http://schemas.openxmlformats.org/officeDocument/2006/relationships" xmlns:p="http://schemas.openxmlformats.org/presentationml/2006/main">
+<p:sld xmlns:a="http://schemas.openxmlformats.org/drawingml/2006/main" xmlns:r="http://schemas.openxmlformats.org/officeDocument/2006/relationships" xmlns:p="http://schemas.openxmlformats.org/presentationml/2006/main" show="0">
   <p:cSld>
     <p:spTree>
       <p:nvGrpSpPr>
@@ -3262,8 +3263,8 @@
         </p:nvSpPr>
         <p:spPr>
           <a:xfrm>
-            <a:off x="1381646" y="1523003"/>
-            <a:ext cx="8822925" cy="1754326"/>
+            <a:off x="685297" y="1194529"/>
+            <a:ext cx="10758020" cy="3046988"/>
           </a:xfrm>
           <a:prstGeom prst="rect">
             <a:avLst/>
@@ -3281,7 +3282,7 @@
               <a:buChar char="•"/>
             </a:pPr>
             <a:r>
-              <a:rPr lang="en-US" dirty="0"/>
+              <a:rPr lang="en-US" sz="2400" dirty="0"/>
               <a:t>First time dealing with a large scale project management and development.</a:t>
             </a:r>
           </a:p>
@@ -3291,7 +3292,7 @@
               <a:buChar char="•"/>
             </a:pPr>
             <a:r>
-              <a:rPr lang="en-US" dirty="0"/>
+              <a:rPr lang="en-US" sz="2400" dirty="0"/>
               <a:t>Working tight with some documents was very helpful (RTM) and with some of them not.</a:t>
             </a:r>
           </a:p>
@@ -3301,7 +3302,7 @@
               <a:buChar char="•"/>
             </a:pPr>
             <a:r>
-              <a:rPr lang="en-US" dirty="0"/>
+              <a:rPr lang="en-US" sz="2400" dirty="0"/>
               <a:t>Better UI planning could have caused less UI changes through the development and easier testing.</a:t>
             </a:r>
           </a:p>
@@ -3311,7 +3312,7 @@
               <a:buChar char="•"/>
             </a:pPr>
             <a:r>
-              <a:rPr lang="en-US" dirty="0"/>
+              <a:rPr lang="en-US" sz="2400" dirty="0"/>
               <a:t>Good communication was needed and helped us to complete the project as planned.</a:t>
             </a:r>
           </a:p>
@@ -3321,7 +3322,7 @@
               <a:buChar char="•"/>
             </a:pPr>
             <a:r>
-              <a:rPr lang="en-US" dirty="0"/>
+              <a:rPr lang="en-US" sz="2400" dirty="0"/>
               <a:t>The most important thing was keeping the team’s spirit.</a:t>
             </a:r>
           </a:p>
@@ -3349,7 +3350,7 @@
         </p:blipFill>
         <p:spPr>
           <a:xfrm>
-            <a:off x="5096760" y="3582802"/>
+            <a:off x="8026391" y="3902398"/>
             <a:ext cx="2467015" cy="2467015"/>
           </a:xfrm>
           <a:prstGeom prst="rect">
@@ -3417,6 +3418,154 @@
           </a:prstGeom>
         </p:spPr>
       </p:pic>
+      <p:sp>
+        <p:nvSpPr>
+          <p:cNvPr id="4" name="Rectangle 3"/>
+          <p:cNvSpPr/>
+          <p:nvPr/>
+        </p:nvSpPr>
+        <p:spPr>
+          <a:xfrm>
+            <a:off x="2942327" y="317960"/>
+            <a:ext cx="5701564" cy="707886"/>
+          </a:xfrm>
+          <a:prstGeom prst="rect">
+            <a:avLst/>
+          </a:prstGeom>
+          <a:noFill/>
+        </p:spPr>
+        <p:txBody>
+          <a:bodyPr wrap="square" lIns="91440" tIns="45720" rIns="91440" bIns="45720">
+            <a:spAutoFit/>
+          </a:bodyPr>
+          <a:lstStyle/>
+          <a:p>
+            <a:pPr algn="ctr"/>
+            <a:r>
+              <a:rPr lang="en-US" sz="4000" b="1" dirty="0">
+                <a:ln w="22225">
+                  <a:solidFill>
+                    <a:schemeClr val="accent2"/>
+                  </a:solidFill>
+                  <a:prstDash val="solid"/>
+                </a:ln>
+                <a:solidFill>
+                  <a:schemeClr val="accent2">
+                    <a:lumMod val="40000"/>
+                    <a:lumOff val="60000"/>
+                  </a:schemeClr>
+                </a:solidFill>
+              </a:rPr>
+              <a:t>Demo</a:t>
+            </a:r>
+            <a:endParaRPr lang="en-US" sz="4000" b="1" cap="none" spc="0" dirty="0">
+              <a:ln w="22225">
+                <a:solidFill>
+                  <a:schemeClr val="accent2"/>
+                </a:solidFill>
+                <a:prstDash val="solid"/>
+              </a:ln>
+              <a:solidFill>
+                <a:schemeClr val="accent2">
+                  <a:lumMod val="40000"/>
+                  <a:lumOff val="60000"/>
+                </a:schemeClr>
+              </a:solidFill>
+              <a:effectLst/>
+            </a:endParaRPr>
+          </a:p>
+        </p:txBody>
+      </p:sp>
+      <p:pic>
+        <p:nvPicPr>
+          <p:cNvPr id="8" name="Picture 7"/>
+          <p:cNvPicPr>
+            <a:picLocks noChangeAspect="1"/>
+          </p:cNvPicPr>
+          <p:nvPr/>
+        </p:nvPicPr>
+        <p:blipFill>
+          <a:blip r:embed="rId3">
+            <a:extLst>
+              <a:ext uri="{28A0092B-C50C-407E-A947-70E740481C1C}">
+                <a14:useLocalDpi xmlns:a14="http://schemas.microsoft.com/office/drawing/2010/main" val="0"/>
+              </a:ext>
+            </a:extLst>
+          </a:blip>
+          <a:stretch>
+            <a:fillRect/>
+          </a:stretch>
+        </p:blipFill>
+        <p:spPr>
+          <a:xfrm>
+            <a:off x="2837827" y="1341817"/>
+            <a:ext cx="6137497" cy="4422713"/>
+          </a:xfrm>
+          <a:prstGeom prst="rect">
+            <a:avLst/>
+          </a:prstGeom>
+        </p:spPr>
+      </p:pic>
+    </p:spTree>
+    <p:extLst>
+      <p:ext uri="{BB962C8B-B14F-4D97-AF65-F5344CB8AC3E}">
+        <p14:creationId xmlns:p14="http://schemas.microsoft.com/office/powerpoint/2010/main" val="988294913"/>
+      </p:ext>
+    </p:extLst>
+  </p:cSld>
+  <p:clrMapOvr>
+    <a:masterClrMapping/>
+  </p:clrMapOvr>
+</p:sld>
+</file>
+
+<file path=ppt/slides/slide12.xml><?xml version="1.0" encoding="utf-8"?>
+<p:sld xmlns:a="http://schemas.openxmlformats.org/drawingml/2006/main" xmlns:r="http://schemas.openxmlformats.org/officeDocument/2006/relationships" xmlns:p="http://schemas.openxmlformats.org/presentationml/2006/main">
+  <p:cSld>
+    <p:spTree>
+      <p:nvGrpSpPr>
+        <p:cNvPr id="1" name=""/>
+        <p:cNvGrpSpPr/>
+        <p:nvPr/>
+      </p:nvGrpSpPr>
+      <p:grpSpPr>
+        <a:xfrm>
+          <a:off x="0" y="0"/>
+          <a:ext cx="0" cy="0"/>
+          <a:chOff x="0" y="0"/>
+          <a:chExt cx="0" cy="0"/>
+        </a:xfrm>
+      </p:grpSpPr>
+      <p:pic>
+        <p:nvPicPr>
+          <p:cNvPr id="2" name="Picture 1"/>
+          <p:cNvPicPr>
+            <a:picLocks noChangeAspect="1"/>
+          </p:cNvPicPr>
+          <p:nvPr/>
+        </p:nvPicPr>
+        <p:blipFill>
+          <a:blip r:embed="rId2">
+            <a:extLst>
+              <a:ext uri="{28A0092B-C50C-407E-A947-70E740481C1C}">
+                <a14:useLocalDpi xmlns:a14="http://schemas.microsoft.com/office/drawing/2010/main" val="0"/>
+              </a:ext>
+            </a:extLst>
+          </a:blip>
+          <a:stretch>
+            <a:fillRect/>
+          </a:stretch>
+        </p:blipFill>
+        <p:spPr>
+          <a:xfrm>
+            <a:off x="9862456" y="0"/>
+            <a:ext cx="2329543" cy="1341817"/>
+          </a:xfrm>
+          <a:prstGeom prst="rect">
+            <a:avLst/>
+          </a:prstGeom>
+        </p:spPr>
+      </p:pic>
       <p:pic>
         <p:nvPicPr>
           <p:cNvPr id="6" name="Picture 5"/>
@@ -3665,7 +3814,7 @@
         <p:spPr>
           <a:xfrm>
             <a:off x="676183" y="1625902"/>
-            <a:ext cx="8744505" cy="923330"/>
+            <a:ext cx="10607335" cy="1200329"/>
           </a:xfrm>
           <a:prstGeom prst="rect">
             <a:avLst/>
@@ -3683,9 +3832,10 @@
               <a:buChar char="•"/>
             </a:pPr>
             <a:r>
-              <a:rPr lang="en-US" dirty="0"/>
-              <a:t>There is a need for modern tools for effective and fast writing skills improvement</a:t>
-            </a:r>
+              <a:rPr lang="en-US" sz="2400" dirty="0"/>
+              <a:t>Excellent writing skills significantly help to get opportunities in the real world</a:t>
+            </a:r>
+            <a:endParaRPr lang="en-US" sz="2400" dirty="0"/>
           </a:p>
           <a:p>
             <a:pPr marL="285750" indent="-285750">
@@ -3693,8 +3843,8 @@
               <a:buChar char="•"/>
             </a:pPr>
             <a:r>
-              <a:rPr lang="en-US" dirty="0"/>
-              <a:t>There is a need for attracting students in the fast growing technology world</a:t>
+              <a:rPr lang="en-US" sz="2400" dirty="0"/>
+              <a:t>There is a need for modern tools for effective and fast writing skills improvement</a:t>
             </a:r>
           </a:p>
           <a:p>
@@ -3703,8 +3853,8 @@
               <a:buChar char="•"/>
             </a:pPr>
             <a:r>
-              <a:rPr lang="en-US" dirty="0"/>
-              <a:t>Excellent writing skills significantly help to get opportunities in the real world</a:t>
+              <a:rPr lang="en-US" sz="2400" dirty="0"/>
+              <a:t>There is a need for attracting students in the fast growing technology world</a:t>
             </a:r>
           </a:p>
         </p:txBody>
@@ -3731,7 +3881,7 @@
         </p:blipFill>
         <p:spPr>
           <a:xfrm>
-            <a:off x="4874611" y="2817942"/>
+            <a:off x="4599403" y="3110316"/>
             <a:ext cx="3088661" cy="2475871"/>
           </a:xfrm>
           <a:prstGeom prst="rect">
@@ -3807,8 +3957,8 @@
         </p:nvSpPr>
         <p:spPr>
           <a:xfrm>
-            <a:off x="676183" y="1625902"/>
-            <a:ext cx="8744505" cy="1200329"/>
+            <a:off x="626615" y="1540656"/>
+            <a:ext cx="9808345" cy="1569660"/>
           </a:xfrm>
           <a:prstGeom prst="rect">
             <a:avLst/>
@@ -3826,7 +3976,7 @@
               <a:buChar char="•"/>
             </a:pPr>
             <a:r>
-              <a:rPr lang="en-US" dirty="0"/>
+              <a:rPr lang="en-US" sz="2400" dirty="0"/>
               <a:t>Friendly WEB learning system</a:t>
             </a:r>
           </a:p>
@@ -3836,7 +3986,7 @@
               <a:buChar char="•"/>
             </a:pPr>
             <a:r>
-              <a:rPr lang="en-US" dirty="0"/>
+              <a:rPr lang="en-US" sz="2400" dirty="0"/>
               <a:t>Three system roles – Student, Teacher and Administrator</a:t>
             </a:r>
           </a:p>
@@ -3846,7 +3996,7 @@
               <a:buChar char="•"/>
             </a:pPr>
             <a:r>
-              <a:rPr lang="en-US" dirty="0"/>
+              <a:rPr lang="en-US" sz="2400" dirty="0"/>
               <a:t>Uploading and managing contents</a:t>
             </a:r>
           </a:p>
@@ -3856,7 +4006,7 @@
               <a:buChar char="•"/>
             </a:pPr>
             <a:r>
-              <a:rPr lang="en-US" dirty="0"/>
+              <a:rPr lang="en-US" sz="2400" dirty="0"/>
               <a:t>Smart Textbox for supporting and improving students’ answers in real-time</a:t>
             </a:r>
           </a:p>
@@ -4085,14 +4235,14 @@
           <p:nvPr>
             <p:extLst>
               <p:ext uri="{D42A27DB-BD31-4B8C-83A1-F6EECF244321}">
-                <p14:modId xmlns:p14="http://schemas.microsoft.com/office/powerpoint/2010/main" val="2359571242"/>
+                <p14:modId xmlns:p14="http://schemas.microsoft.com/office/powerpoint/2010/main" val="1503001443"/>
               </p:ext>
             </p:extLst>
           </p:nvPr>
         </p:nvGraphicFramePr>
         <p:xfrm>
-          <a:off x="1278152" y="2145116"/>
-          <a:ext cx="9602540" cy="2965185"/>
+          <a:off x="1200609" y="1683477"/>
+          <a:ext cx="9602540" cy="3696705"/>
         </p:xfrm>
         <a:graphic>
           <a:graphicData uri="http://schemas.openxmlformats.org/drawingml/2006/table">
@@ -4143,7 +4293,7 @@
                     <a:bodyPr/>
                     <a:lstStyle/>
                     <a:p>
-                      <a:endParaRPr lang="en-US" dirty="0"/>
+                      <a:endParaRPr lang="en-US" sz="2400" dirty="0"/>
                     </a:p>
                   </a:txBody>
                   <a:tcPr/>
@@ -4154,7 +4304,7 @@
                     <a:lstStyle/>
                     <a:p>
                       <a:r>
-                        <a:rPr lang="en-US" dirty="0"/>
+                        <a:rPr lang="en-US" sz="2400" dirty="0"/>
                         <a:t>Entity Framework</a:t>
                       </a:r>
                     </a:p>
@@ -4167,14 +4317,14 @@
                     <a:lstStyle/>
                     <a:p>
                       <a:r>
-                        <a:rPr lang="en-US" dirty="0"/>
+                        <a:rPr lang="en-US" sz="2400" dirty="0"/>
                         <a:t>Availability for different devices and operating systems</a:t>
                       </a:r>
                       <a:r>
-                        <a:rPr lang="en-US" baseline="0" dirty="0"/>
+                        <a:rPr lang="en-US" sz="2400" baseline="0" dirty="0"/>
                         <a:t> </a:t>
                       </a:r>
-                      <a:endParaRPr lang="en-US" dirty="0"/>
+                      <a:endParaRPr lang="en-US" sz="2400" dirty="0"/>
                     </a:p>
                   </a:txBody>
                   <a:tcPr/>
@@ -4185,13 +4335,13 @@
                     <a:lstStyle/>
                     <a:p>
                       <a:r>
-                        <a:rPr lang="en-US" dirty="0"/>
+                        <a:rPr lang="en-US" sz="2400" dirty="0"/>
                         <a:t>Easy deployment</a:t>
                       </a:r>
                     </a:p>
                     <a:p>
                       <a:r>
-                        <a:rPr lang="en-US" dirty="0"/>
+                        <a:rPr lang="en-US" sz="2400" dirty="0"/>
                         <a:t>And software updates</a:t>
                       </a:r>
                     </a:p>
@@ -4204,7 +4354,7 @@
                     <a:lstStyle/>
                     <a:p>
                       <a:r>
-                        <a:rPr lang="en-US" dirty="0"/>
+                        <a:rPr lang="en-US" sz="2400" dirty="0"/>
                         <a:t>Easy use of libraries and extensions</a:t>
                       </a:r>
                     </a:p>
@@ -4224,7 +4374,7 @@
                     <a:lstStyle/>
                     <a:p>
                       <a:pPr algn="ctr"/>
-                      <a:endParaRPr lang="en-US" b="1" dirty="0"/>
+                      <a:endParaRPr lang="en-US" sz="2400" b="1" dirty="0"/>
                     </a:p>
                   </a:txBody>
                   <a:tcPr/>
@@ -4234,7 +4384,7 @@
                     <a:bodyPr/>
                     <a:lstStyle/>
                     <a:p>
-                      <a:endParaRPr lang="en-US"/>
+                      <a:endParaRPr lang="en-US" sz="2400"/>
                     </a:p>
                   </a:txBody>
                   <a:tcPr/>
@@ -4244,7 +4394,7 @@
                     <a:bodyPr/>
                     <a:lstStyle/>
                     <a:p>
-                      <a:endParaRPr lang="en-US"/>
+                      <a:endParaRPr lang="en-US" sz="2400"/>
                     </a:p>
                   </a:txBody>
                   <a:tcPr/>
@@ -4254,7 +4404,7 @@
                     <a:bodyPr/>
                     <a:lstStyle/>
                     <a:p>
-                      <a:endParaRPr lang="en-US"/>
+                      <a:endParaRPr lang="en-US" sz="2400"/>
                     </a:p>
                   </a:txBody>
                   <a:tcPr/>
@@ -4264,7 +4414,7 @@
                     <a:bodyPr/>
                     <a:lstStyle/>
                     <a:p>
-                      <a:endParaRPr lang="en-US"/>
+                      <a:endParaRPr lang="en-US" sz="2400"/>
                     </a:p>
                   </a:txBody>
                   <a:tcPr/>
@@ -4282,7 +4432,7 @@
                     <a:lstStyle/>
                     <a:p>
                       <a:pPr algn="ctr"/>
-                      <a:endParaRPr lang="en-US" b="1" dirty="0"/>
+                      <a:endParaRPr lang="en-US" sz="2400" b="1" dirty="0"/>
                     </a:p>
                   </a:txBody>
                   <a:tcPr/>
@@ -4292,7 +4442,7 @@
                     <a:bodyPr/>
                     <a:lstStyle/>
                     <a:p>
-                      <a:endParaRPr lang="en-US"/>
+                      <a:endParaRPr lang="en-US" sz="2400"/>
                     </a:p>
                   </a:txBody>
                   <a:tcPr/>
@@ -4302,7 +4452,7 @@
                     <a:bodyPr/>
                     <a:lstStyle/>
                     <a:p>
-                      <a:endParaRPr lang="en-US"/>
+                      <a:endParaRPr lang="en-US" sz="2400"/>
                     </a:p>
                   </a:txBody>
                   <a:tcPr/>
@@ -4312,7 +4462,7 @@
                     <a:bodyPr/>
                     <a:lstStyle/>
                     <a:p>
-                      <a:endParaRPr lang="en-US"/>
+                      <a:endParaRPr lang="en-US" sz="2400"/>
                     </a:p>
                   </a:txBody>
                   <a:tcPr/>
@@ -4322,7 +4472,7 @@
                     <a:bodyPr/>
                     <a:lstStyle/>
                     <a:p>
-                      <a:endParaRPr lang="en-US"/>
+                      <a:endParaRPr lang="en-US" sz="2400"/>
                     </a:p>
                   </a:txBody>
                   <a:tcPr/>
@@ -4340,7 +4490,7 @@
                     <a:lstStyle/>
                     <a:p>
                       <a:pPr algn="ctr"/>
-                      <a:endParaRPr lang="en-US" b="1" dirty="0"/>
+                      <a:endParaRPr lang="en-US" sz="2400" b="1" dirty="0"/>
                     </a:p>
                   </a:txBody>
                   <a:tcPr/>
@@ -4350,7 +4500,7 @@
                     <a:bodyPr/>
                     <a:lstStyle/>
                     <a:p>
-                      <a:endParaRPr lang="en-US"/>
+                      <a:endParaRPr lang="en-US" sz="2400"/>
                     </a:p>
                   </a:txBody>
                   <a:tcPr/>
@@ -4360,7 +4510,7 @@
                     <a:bodyPr/>
                     <a:lstStyle/>
                     <a:p>
-                      <a:endParaRPr lang="en-US"/>
+                      <a:endParaRPr lang="en-US" sz="2400"/>
                     </a:p>
                   </a:txBody>
                   <a:tcPr/>
@@ -4370,7 +4520,7 @@
                     <a:bodyPr/>
                     <a:lstStyle/>
                     <a:p>
-                      <a:endParaRPr lang="en-US"/>
+                      <a:endParaRPr lang="en-US" sz="2400"/>
                     </a:p>
                   </a:txBody>
                   <a:tcPr/>
@@ -4380,7 +4530,7 @@
                     <a:bodyPr/>
                     <a:lstStyle/>
                     <a:p>
-                      <a:endParaRPr lang="en-US" dirty="0"/>
+                      <a:endParaRPr lang="en-US" sz="2400" dirty="0"/>
                     </a:p>
                   </a:txBody>
                   <a:tcPr/>
@@ -4417,7 +4567,7 @@
         </p:blipFill>
         <p:spPr>
           <a:xfrm>
-            <a:off x="5885868" y="4052696"/>
+            <a:off x="5814846" y="4292393"/>
             <a:ext cx="301841" cy="301841"/>
           </a:xfrm>
           <a:prstGeom prst="rect">
@@ -4447,7 +4597,7 @@
         </p:blipFill>
         <p:spPr>
           <a:xfrm>
-            <a:off x="9697347" y="3469014"/>
+            <a:off x="9626325" y="3708711"/>
             <a:ext cx="301841" cy="301841"/>
           </a:xfrm>
           <a:prstGeom prst="rect">
@@ -4477,7 +4627,7 @@
         </p:blipFill>
         <p:spPr>
           <a:xfrm>
-            <a:off x="3961498" y="3531255"/>
+            <a:off x="3890476" y="3770952"/>
             <a:ext cx="301841" cy="301841"/>
           </a:xfrm>
           <a:prstGeom prst="rect">
@@ -4507,7 +4657,7 @@
         </p:blipFill>
         <p:spPr>
           <a:xfrm>
-            <a:off x="3881228" y="4545513"/>
+            <a:off x="3810206" y="4785210"/>
             <a:ext cx="473955" cy="473955"/>
           </a:xfrm>
           <a:prstGeom prst="rect">
@@ -4537,7 +4687,7 @@
         </p:blipFill>
         <p:spPr>
           <a:xfrm>
-            <a:off x="3881228" y="3978804"/>
+            <a:off x="3810206" y="4218501"/>
             <a:ext cx="473955" cy="473955"/>
           </a:xfrm>
           <a:prstGeom prst="rect">
@@ -4567,7 +4717,7 @@
         </p:blipFill>
         <p:spPr>
           <a:xfrm>
-            <a:off x="9629320" y="4524542"/>
+            <a:off x="9558298" y="4764239"/>
             <a:ext cx="473955" cy="473955"/>
           </a:xfrm>
           <a:prstGeom prst="rect">
@@ -4597,7 +4747,7 @@
         </p:blipFill>
         <p:spPr>
           <a:xfrm>
-            <a:off x="7732622" y="4531518"/>
+            <a:off x="7661600" y="4771215"/>
             <a:ext cx="473955" cy="473955"/>
           </a:xfrm>
           <a:prstGeom prst="rect">
@@ -4627,7 +4777,7 @@
         </p:blipFill>
         <p:spPr>
           <a:xfrm>
-            <a:off x="5835924" y="4545513"/>
+            <a:off x="5764902" y="4785210"/>
             <a:ext cx="473955" cy="473955"/>
           </a:xfrm>
           <a:prstGeom prst="rect">
@@ -4657,7 +4807,7 @@
         </p:blipFill>
         <p:spPr>
           <a:xfrm>
-            <a:off x="9611289" y="3948209"/>
+            <a:off x="9540267" y="4187906"/>
             <a:ext cx="473955" cy="473955"/>
           </a:xfrm>
           <a:prstGeom prst="rect">
@@ -4687,7 +4837,7 @@
         </p:blipFill>
         <p:spPr>
           <a:xfrm>
-            <a:off x="7832433" y="4052346"/>
+            <a:off x="7761411" y="4292043"/>
             <a:ext cx="301841" cy="301841"/>
           </a:xfrm>
           <a:prstGeom prst="rect">
@@ -4717,7 +4867,7 @@
         </p:blipFill>
         <p:spPr>
           <a:xfrm>
-            <a:off x="5842445" y="3387765"/>
+            <a:off x="5771423" y="3627462"/>
             <a:ext cx="473955" cy="473955"/>
           </a:xfrm>
           <a:prstGeom prst="rect">
@@ -4747,7 +4897,7 @@
         </p:blipFill>
         <p:spPr>
           <a:xfrm>
-            <a:off x="7746374" y="3371853"/>
+            <a:off x="7675352" y="3611550"/>
             <a:ext cx="473955" cy="473955"/>
           </a:xfrm>
           <a:prstGeom prst="rect">
@@ -4777,7 +4927,7 @@
         </p:blipFill>
         <p:spPr>
           <a:xfrm>
-            <a:off x="1729023" y="4538536"/>
+            <a:off x="1658001" y="4778233"/>
             <a:ext cx="990478" cy="528255"/>
           </a:xfrm>
           <a:prstGeom prst="rect">
@@ -4808,7 +4958,7 @@
         </p:blipFill>
         <p:spPr bwMode="auto">
           <a:xfrm>
-            <a:off x="1682751" y="3066182"/>
+            <a:off x="1611729" y="3305879"/>
             <a:ext cx="1107505" cy="1107505"/>
           </a:xfrm>
           <a:prstGeom prst="rect">
@@ -4848,7 +4998,7 @@
         </p:blipFill>
         <p:spPr>
           <a:xfrm>
-            <a:off x="1799375" y="3978804"/>
+            <a:off x="1728353" y="4218501"/>
             <a:ext cx="833322" cy="524684"/>
           </a:xfrm>
           <a:prstGeom prst="rect">
@@ -4870,7 +5020,7 @@
 </file>
 
 <file path=ppt/slides/slide5.xml><?xml version="1.0" encoding="utf-8"?>
-<p:sld xmlns:a="http://schemas.openxmlformats.org/drawingml/2006/main" xmlns:r="http://schemas.openxmlformats.org/officeDocument/2006/relationships" xmlns:p="http://schemas.openxmlformats.org/presentationml/2006/main">
+<p:sld xmlns:a="http://schemas.openxmlformats.org/drawingml/2006/main" xmlns:r="http://schemas.openxmlformats.org/officeDocument/2006/relationships" xmlns:p="http://schemas.openxmlformats.org/presentationml/2006/main" show="0">
   <p:cSld>
     <p:spTree>
       <p:nvGrpSpPr>
@@ -5107,7 +5257,7 @@
         <p:spPr>
           <a:xfrm>
             <a:off x="469880" y="1908685"/>
-            <a:ext cx="8194090" cy="369332"/>
+            <a:ext cx="8194090" cy="830997"/>
           </a:xfrm>
           <a:prstGeom prst="rect">
             <a:avLst/>
@@ -5121,14 +5271,14 @@
           <a:lstStyle/>
           <a:p>
             <a:r>
-              <a:rPr lang="en-US" b="1" u="sng" dirty="0"/>
+              <a:rPr lang="en-US" sz="2400" b="1" u="sng" dirty="0"/>
               <a:t>The Problem:</a:t>
             </a:r>
             <a:r>
-              <a:rPr lang="en-US" dirty="0"/>
+              <a:rPr lang="en-US" sz="2400" dirty="0"/>
               <a:t> Data loss in case of connection issues and system errors.</a:t>
             </a:r>
-            <a:endParaRPr lang="he-IL" dirty="0"/>
+            <a:endParaRPr lang="he-IL" sz="2400" dirty="0"/>
           </a:p>
         </p:txBody>
       </p:sp>
@@ -5198,7 +5348,7 @@
         </p:blipFill>
         <p:spPr>
           <a:xfrm>
-            <a:off x="7577549" y="1315347"/>
+            <a:off x="8663970" y="1641299"/>
             <a:ext cx="2402222" cy="1723817"/>
           </a:xfrm>
           <a:prstGeom prst="rect">
@@ -5215,7 +5365,7 @@
         <p:spPr>
           <a:xfrm>
             <a:off x="469880" y="3039164"/>
-            <a:ext cx="8194090" cy="1477328"/>
+            <a:ext cx="8194090" cy="1938992"/>
           </a:xfrm>
           <a:prstGeom prst="rect">
             <a:avLst/>
@@ -5229,16 +5379,16 @@
           <a:lstStyle/>
           <a:p>
             <a:r>
-              <a:rPr lang="en-US" b="1" u="sng" dirty="0"/>
+              <a:rPr lang="en-US" sz="2400" b="1" u="sng" dirty="0"/>
               <a:t>The Solution:</a:t>
             </a:r>
             <a:r>
-              <a:rPr lang="en-US" dirty="0"/>
+              <a:rPr lang="en-US" sz="2400" dirty="0"/>
               <a:t> Temporary Files System.</a:t>
             </a:r>
           </a:p>
           <a:p>
-            <a:endParaRPr lang="en-US" dirty="0"/>
+            <a:endParaRPr lang="en-US" sz="2400" dirty="0"/>
           </a:p>
           <a:p>
             <a:pPr marL="285750" indent="-285750">
@@ -5246,7 +5396,7 @@
               <a:buChar char="•"/>
             </a:pPr>
             <a:r>
-              <a:rPr lang="en-US" dirty="0"/>
+              <a:rPr lang="en-US" sz="2400" dirty="0"/>
               <a:t>Managing temporary folders and files</a:t>
             </a:r>
           </a:p>
@@ -5256,7 +5406,7 @@
               <a:buChar char="•"/>
             </a:pPr>
             <a:r>
-              <a:rPr lang="en-US" dirty="0"/>
+              <a:rPr lang="en-US" sz="2400" dirty="0"/>
               <a:t>Writing Objects into files and parsing files into Objects</a:t>
             </a:r>
           </a:p>
@@ -5266,7 +5416,7 @@
               <a:buChar char="•"/>
             </a:pPr>
             <a:r>
-              <a:rPr lang="en-US" dirty="0"/>
+              <a:rPr lang="en-US" sz="2400" dirty="0"/>
               <a:t>Unique folder per session</a:t>
             </a:r>
           </a:p>
@@ -5294,7 +5444,7 @@
         </p:blipFill>
         <p:spPr>
           <a:xfrm>
-            <a:off x="6087050" y="3249033"/>
+            <a:off x="7585696" y="3664598"/>
             <a:ext cx="2156547" cy="2210955"/>
           </a:xfrm>
           <a:prstGeom prst="rect">
@@ -5370,8 +5520,8 @@
         </p:nvSpPr>
         <p:spPr>
           <a:xfrm>
-            <a:off x="469880" y="1713377"/>
-            <a:ext cx="7679821" cy="646331"/>
+            <a:off x="469880" y="1477665"/>
+            <a:ext cx="9109126" cy="830997"/>
           </a:xfrm>
           <a:prstGeom prst="rect">
             <a:avLst/>
@@ -5385,14 +5535,14 @@
           <a:lstStyle/>
           <a:p>
             <a:r>
-              <a:rPr lang="en-US" b="1" u="sng" dirty="0"/>
+              <a:rPr lang="en-US" sz="2400" b="1" u="sng" dirty="0"/>
               <a:t>The Problem:</a:t>
             </a:r>
             <a:r>
-              <a:rPr lang="en-US" dirty="0"/>
+              <a:rPr lang="en-US" sz="2400" dirty="0"/>
               <a:t> Every small change in the business model leads to a complex migration process and slows down the development.</a:t>
             </a:r>
-            <a:endParaRPr lang="he-IL" dirty="0"/>
+            <a:endParaRPr lang="he-IL" sz="2400" dirty="0"/>
           </a:p>
         </p:txBody>
       </p:sp>
@@ -5448,8 +5598,8 @@
         </p:nvSpPr>
         <p:spPr>
           <a:xfrm>
-            <a:off x="469880" y="2772834"/>
-            <a:ext cx="8194090" cy="1754326"/>
+            <a:off x="469880" y="2659954"/>
+            <a:ext cx="8194090" cy="2308324"/>
           </a:xfrm>
           <a:prstGeom prst="rect">
             <a:avLst/>
@@ -5463,16 +5613,16 @@
           <a:lstStyle/>
           <a:p>
             <a:r>
-              <a:rPr lang="en-US" b="1" u="sng" dirty="0"/>
+              <a:rPr lang="en-US" sz="2400" b="1" u="sng" dirty="0"/>
               <a:t>The Solution:</a:t>
             </a:r>
             <a:r>
-              <a:rPr lang="en-US" dirty="0"/>
+              <a:rPr lang="en-US" sz="2400" dirty="0"/>
               <a:t> Automatic migrations.</a:t>
             </a:r>
           </a:p>
           <a:p>
-            <a:endParaRPr lang="en-US" dirty="0"/>
+            <a:endParaRPr lang="en-US" sz="2400" dirty="0"/>
           </a:p>
           <a:p>
             <a:pPr marL="285750" indent="-285750">
@@ -5480,7 +5630,7 @@
               <a:buChar char="•"/>
             </a:pPr>
             <a:r>
-              <a:rPr lang="en-US" dirty="0"/>
+              <a:rPr lang="en-US" sz="2400" dirty="0"/>
               <a:t>Schema changes create DB migrations automatically</a:t>
             </a:r>
           </a:p>
@@ -5490,7 +5640,7 @@
               <a:buChar char="•"/>
             </a:pPr>
             <a:r>
-              <a:rPr lang="en-US" dirty="0"/>
+              <a:rPr lang="en-US" sz="2400" dirty="0"/>
               <a:t>Seeded data is recreated to match the new DB scheme</a:t>
             </a:r>
           </a:p>
@@ -5500,7 +5650,7 @@
               <a:buChar char="•"/>
             </a:pPr>
             <a:r>
-              <a:rPr lang="en-US" dirty="0"/>
+              <a:rPr lang="en-US" sz="2400" dirty="0"/>
               <a:t>Makes changing the data model very comfortable and viable even late in development and after releasing to the customer</a:t>
             </a:r>
           </a:p>
@@ -5528,7 +5678,7 @@
         </p:blipFill>
         <p:spPr>
           <a:xfrm>
-            <a:off x="8149701" y="2516382"/>
+            <a:off x="8819648" y="2232297"/>
             <a:ext cx="2085616" cy="2085616"/>
           </a:xfrm>
           <a:prstGeom prst="rect">
@@ -6198,8 +6348,8 @@
         </p:nvSpPr>
         <p:spPr>
           <a:xfrm>
-            <a:off x="1324252" y="1876298"/>
-            <a:ext cx="8194090" cy="1754326"/>
+            <a:off x="449801" y="1410714"/>
+            <a:ext cx="8194090" cy="2308324"/>
           </a:xfrm>
           <a:prstGeom prst="rect">
             <a:avLst/>
@@ -6217,7 +6367,7 @@
               <a:buChar char="•"/>
             </a:pPr>
             <a:r>
-              <a:rPr lang="en-US" dirty="0"/>
+              <a:rPr lang="en-US" sz="2400" dirty="0"/>
               <a:t>Version control with Bitbucket</a:t>
             </a:r>
           </a:p>
@@ -6227,7 +6377,7 @@
               <a:buChar char="•"/>
             </a:pPr>
             <a:r>
-              <a:rPr lang="en-US" dirty="0"/>
+              <a:rPr lang="en-US" sz="2400" dirty="0"/>
               <a:t>Requirement traceability document</a:t>
             </a:r>
           </a:p>
@@ -6237,7 +6387,7 @@
               <a:buChar char="•"/>
             </a:pPr>
             <a:r>
-              <a:rPr lang="en-US" dirty="0"/>
+              <a:rPr lang="en-US" sz="2400" dirty="0"/>
               <a:t>Manual and automated tests per requirement</a:t>
             </a:r>
           </a:p>
@@ -6247,7 +6397,7 @@
               <a:buChar char="•"/>
             </a:pPr>
             <a:r>
-              <a:rPr lang="en-US" dirty="0"/>
+              <a:rPr lang="en-US" sz="2400" dirty="0"/>
               <a:t>Independent software components and work areas</a:t>
             </a:r>
           </a:p>
@@ -6257,7 +6407,7 @@
               <a:buChar char="•"/>
             </a:pPr>
             <a:r>
-              <a:rPr lang="en-US" dirty="0"/>
+              <a:rPr lang="en-US" sz="2400" dirty="0"/>
               <a:t>Task prioritization</a:t>
             </a:r>
           </a:p>
@@ -6267,7 +6417,7 @@
               <a:buChar char="•"/>
             </a:pPr>
             <a:r>
-              <a:rPr lang="en-US" dirty="0"/>
+              <a:rPr lang="en-US" sz="2400" dirty="0"/>
               <a:t>Team meetings</a:t>
             </a:r>
           </a:p>
@@ -6377,7 +6527,7 @@
         </p:blipFill>
         <p:spPr>
           <a:xfrm>
-            <a:off x="7225590" y="1364804"/>
+            <a:off x="7396702" y="1410714"/>
             <a:ext cx="4257675" cy="3381375"/>
           </a:xfrm>
           <a:prstGeom prst="rect">

</xml_diff>